<commit_message>
added solution and technicals
</commit_message>
<xml_diff>
--- a/docs/Assignment.pptx
+++ b/docs/Assignment.pptx
@@ -7,7 +7,9 @@
   <p:sldIdLst>
     <p:sldId id="256" r:id="rId2"/>
     <p:sldId id="258" r:id="rId3"/>
-    <p:sldId id="257" r:id="rId4"/>
+    <p:sldId id="260" r:id="rId4"/>
+    <p:sldId id="259" r:id="rId5"/>
+    <p:sldId id="262" r:id="rId6"/>
   </p:sldIdLst>
   <p:sldSz cx="12192000" cy="6858000"/>
   <p:notesSz cx="6858000" cy="9144000"/>
@@ -1611,11 +1613,47 @@
 <file path=ppt/diagrams/data1.xml><?xml version="1.0" encoding="utf-8"?>
 <dgm:dataModel xmlns:dgm="http://schemas.openxmlformats.org/drawingml/2006/diagram" xmlns:a="http://schemas.openxmlformats.org/drawingml/2006/main">
   <dgm:ptLst>
-    <dgm:pt modelId="{5F805F24-A7B5-4958-9589-E18A3F5F2938}" type="doc">
-      <dgm:prSet loTypeId="urn:microsoft.com/office/officeart/2005/8/layout/process1" loCatId="process" qsTypeId="urn:microsoft.com/office/officeart/2005/8/quickstyle/simple1" qsCatId="simple" csTypeId="urn:microsoft.com/office/officeart/2005/8/colors/accent1_2" csCatId="accent1" phldr="1"/>
+    <dgm:pt modelId="{C8CC17A4-8E74-42D4-BA15-632FB72F7115}" type="doc">
+      <dgm:prSet loTypeId="urn:microsoft.com/office/officeart/2005/8/layout/process2" loCatId="process" qsTypeId="urn:microsoft.com/office/officeart/2005/8/quickstyle/simple1" qsCatId="simple" csTypeId="urn:microsoft.com/office/officeart/2005/8/colors/accent1_2" csCatId="accent1" phldr="1"/>
       <dgm:spPr/>
     </dgm:pt>
-    <dgm:pt modelId="{3C1271AD-3592-4F31-A8B7-D990DDA75E6C}">
+    <dgm:pt modelId="{5873FF6C-D3FE-4997-8793-5B6C5BC3B860}">
+      <dgm:prSet phldrT="[Text]"/>
+      <dgm:spPr/>
+      <dgm:t>
+        <a:bodyPr/>
+        <a:lstStyle/>
+        <a:p>
+          <a:r>
+            <a:rPr lang="en-US" dirty="0"/>
+            <a:t>Block</a:t>
+          </a:r>
+        </a:p>
+      </dgm:t>
+    </dgm:pt>
+    <dgm:pt modelId="{30518536-EE78-4B63-ADB1-3CE1C780B910}" type="parTrans" cxnId="{86C28CA4-19CD-46FF-A5BE-7B154305FDE5}">
+      <dgm:prSet/>
+      <dgm:spPr/>
+      <dgm:t>
+        <a:bodyPr/>
+        <a:lstStyle/>
+        <a:p>
+          <a:endParaRPr lang="en-US"/>
+        </a:p>
+      </dgm:t>
+    </dgm:pt>
+    <dgm:pt modelId="{D6E57E89-6909-457C-9C2C-04A7F039A1CF}" type="sibTrans" cxnId="{86C28CA4-19CD-46FF-A5BE-7B154305FDE5}">
+      <dgm:prSet/>
+      <dgm:spPr/>
+      <dgm:t>
+        <a:bodyPr/>
+        <a:lstStyle/>
+        <a:p>
+          <a:endParaRPr lang="en-US"/>
+        </a:p>
+      </dgm:t>
+    </dgm:pt>
+    <dgm:pt modelId="{F58920D5-23CF-4768-9FB9-C85599FD1470}">
       <dgm:prSet phldrT="[Text]"/>
       <dgm:spPr/>
       <dgm:t>
@@ -1629,7 +1667,7 @@
         </a:p>
       </dgm:t>
     </dgm:pt>
-    <dgm:pt modelId="{5F0D6EE3-E1A7-44AB-9D10-5BDDEAD71C0F}" type="parTrans" cxnId="{CA50127A-1FA1-47E2-949C-BFCB29936161}">
+    <dgm:pt modelId="{D838684F-D205-4D7B-B493-3FFFA570B8EF}" type="parTrans" cxnId="{F905C83E-ACCF-411D-BAB0-BA78AFF8F3A9}">
       <dgm:prSet/>
       <dgm:spPr/>
       <dgm:t>
@@ -1640,7 +1678,7 @@
         </a:p>
       </dgm:t>
     </dgm:pt>
-    <dgm:pt modelId="{57762566-40FF-4A75-AE35-E5873A1303D0}" type="sibTrans" cxnId="{CA50127A-1FA1-47E2-949C-BFCB29936161}">
+    <dgm:pt modelId="{C6731D29-7BBA-4714-BAFF-45EAC202309B}" type="sibTrans" cxnId="{F905C83E-ACCF-411D-BAB0-BA78AFF8F3A9}">
       <dgm:prSet/>
       <dgm:spPr/>
       <dgm:t>
@@ -1651,7 +1689,7 @@
         </a:p>
       </dgm:t>
     </dgm:pt>
-    <dgm:pt modelId="{B936ED49-F1F2-4109-89EC-52CE0F90D65D}">
+    <dgm:pt modelId="{ED51EA2B-502E-4FF7-93E1-243E6405D8A7}">
       <dgm:prSet phldrT="[Text]"/>
       <dgm:spPr/>
       <dgm:t>
@@ -1660,12 +1698,12 @@
         <a:p>
           <a:r>
             <a:rPr lang="en-US" dirty="0"/>
-            <a:t>Inspect</a:t>
+            <a:t>Tooth</a:t>
           </a:r>
         </a:p>
       </dgm:t>
     </dgm:pt>
-    <dgm:pt modelId="{386BA9D1-CF41-4020-8186-C4038C5F7470}" type="parTrans" cxnId="{6DA0DE07-ABFE-426F-A5C7-5F317D795D82}">
+    <dgm:pt modelId="{C62B16BC-2943-49F4-9393-1739F1D7CA5C}" type="parTrans" cxnId="{0D14A5A7-156E-4E49-94D1-5A504547C152}">
       <dgm:prSet/>
       <dgm:spPr/>
       <dgm:t>
@@ -1676,7 +1714,7 @@
         </a:p>
       </dgm:t>
     </dgm:pt>
-    <dgm:pt modelId="{B242CC7C-30FF-4407-898B-28EDF05C518C}" type="sibTrans" cxnId="{6DA0DE07-ABFE-426F-A5C7-5F317D795D82}">
+    <dgm:pt modelId="{0B0102E1-0078-4C8D-929F-1AF3BEB2FA4B}" type="sibTrans" cxnId="{0D14A5A7-156E-4E49-94D1-5A504547C152}">
       <dgm:prSet/>
       <dgm:spPr/>
       <dgm:t>
@@ -1687,85 +1725,48 @@
         </a:p>
       </dgm:t>
     </dgm:pt>
-    <dgm:pt modelId="{22A3833B-0BC2-4E32-97B7-2FEDFFC4F3DA}">
-      <dgm:prSet phldrT="[Text]"/>
-      <dgm:spPr/>
-      <dgm:t>
-        <a:bodyPr/>
-        <a:lstStyle/>
-        <a:p>
-          <a:r>
-            <a:rPr lang="en-US" dirty="0"/>
-            <a:t>Job</a:t>
-          </a:r>
-        </a:p>
-      </dgm:t>
-    </dgm:pt>
-    <dgm:pt modelId="{D42CE5B1-12D8-465C-882F-C30B57D77799}" type="parTrans" cxnId="{A9BFC707-EC0A-4961-873F-1D4DC4FADF51}">
-      <dgm:prSet/>
-      <dgm:spPr/>
-      <dgm:t>
-        <a:bodyPr/>
-        <a:lstStyle/>
-        <a:p>
-          <a:endParaRPr lang="en-US"/>
-        </a:p>
-      </dgm:t>
-    </dgm:pt>
-    <dgm:pt modelId="{C85743DE-F4F7-4218-9505-C79FF336AF9C}" type="sibTrans" cxnId="{A9BFC707-EC0A-4961-873F-1D4DC4FADF51}">
-      <dgm:prSet/>
-      <dgm:spPr/>
-      <dgm:t>
-        <a:bodyPr/>
-        <a:lstStyle/>
-        <a:p>
-          <a:endParaRPr lang="en-US"/>
-        </a:p>
-      </dgm:t>
-    </dgm:pt>
-    <dgm:pt modelId="{8B0863AF-9722-45B0-BCB5-A479631E7106}" type="pres">
-      <dgm:prSet presAssocID="{5F805F24-A7B5-4958-9589-E18A3F5F2938}" presName="Name0" presStyleCnt="0">
+    <dgm:pt modelId="{AB1D597E-8DE5-4422-8901-929706B3F80A}" type="pres">
+      <dgm:prSet presAssocID="{C8CC17A4-8E74-42D4-BA15-632FB72F7115}" presName="linearFlow" presStyleCnt="0">
         <dgm:presLayoutVars>
-          <dgm:dir/>
           <dgm:resizeHandles val="exact"/>
         </dgm:presLayoutVars>
       </dgm:prSet>
       <dgm:spPr/>
     </dgm:pt>
-    <dgm:pt modelId="{6D8BBAB4-09F7-4900-82A2-764A06B12B27}" type="pres">
-      <dgm:prSet presAssocID="{22A3833B-0BC2-4E32-97B7-2FEDFFC4F3DA}" presName="node" presStyleLbl="node1" presStyleIdx="0" presStyleCnt="3">
+    <dgm:pt modelId="{FBDB5662-0F45-4200-BC7C-4A256F6880EC}" type="pres">
+      <dgm:prSet presAssocID="{5873FF6C-D3FE-4997-8793-5B6C5BC3B860}" presName="node" presStyleLbl="node1" presStyleIdx="0" presStyleCnt="3">
         <dgm:presLayoutVars>
           <dgm:bulletEnabled val="1"/>
         </dgm:presLayoutVars>
       </dgm:prSet>
       <dgm:spPr/>
     </dgm:pt>
-    <dgm:pt modelId="{F0F96126-198F-463E-A5B2-B26D69E111D9}" type="pres">
-      <dgm:prSet presAssocID="{C85743DE-F4F7-4218-9505-C79FF336AF9C}" presName="sibTrans" presStyleLbl="sibTrans2D1" presStyleIdx="0" presStyleCnt="2"/>
+    <dgm:pt modelId="{1D81585D-8D2A-46FE-B2AE-EDE88F39D723}" type="pres">
+      <dgm:prSet presAssocID="{D6E57E89-6909-457C-9C2C-04A7F039A1CF}" presName="sibTrans" presStyleLbl="sibTrans2D1" presStyleIdx="0" presStyleCnt="2"/>
       <dgm:spPr/>
     </dgm:pt>
-    <dgm:pt modelId="{1ABD19B8-7CAC-4FC0-8CF2-C86820A88BD2}" type="pres">
-      <dgm:prSet presAssocID="{C85743DE-F4F7-4218-9505-C79FF336AF9C}" presName="connectorText" presStyleLbl="sibTrans2D1" presStyleIdx="0" presStyleCnt="2"/>
+    <dgm:pt modelId="{C3029BB3-D346-4C95-8D95-61553A1E3CE8}" type="pres">
+      <dgm:prSet presAssocID="{D6E57E89-6909-457C-9C2C-04A7F039A1CF}" presName="connectorText" presStyleLbl="sibTrans2D1" presStyleIdx="0" presStyleCnt="2"/>
       <dgm:spPr/>
     </dgm:pt>
-    <dgm:pt modelId="{E4960A1A-F9AC-4ED5-A131-9CD6BFA10817}" type="pres">
-      <dgm:prSet presAssocID="{3C1271AD-3592-4F31-A8B7-D990DDA75E6C}" presName="node" presStyleLbl="node1" presStyleIdx="1" presStyleCnt="3">
+    <dgm:pt modelId="{1BB1F1CC-93AA-42FB-AB75-D5A30BBB25D8}" type="pres">
+      <dgm:prSet presAssocID="{F58920D5-23CF-4768-9FB9-C85599FD1470}" presName="node" presStyleLbl="node1" presStyleIdx="1" presStyleCnt="3">
         <dgm:presLayoutVars>
           <dgm:bulletEnabled val="1"/>
         </dgm:presLayoutVars>
       </dgm:prSet>
       <dgm:spPr/>
     </dgm:pt>
-    <dgm:pt modelId="{5C592176-504A-4D05-8069-F949DCE533BB}" type="pres">
-      <dgm:prSet presAssocID="{57762566-40FF-4A75-AE35-E5873A1303D0}" presName="sibTrans" presStyleLbl="sibTrans2D1" presStyleIdx="1" presStyleCnt="2"/>
+    <dgm:pt modelId="{A145DEA5-9128-4F31-8C33-507184A4CD23}" type="pres">
+      <dgm:prSet presAssocID="{C6731D29-7BBA-4714-BAFF-45EAC202309B}" presName="sibTrans" presStyleLbl="sibTrans2D1" presStyleIdx="1" presStyleCnt="2"/>
       <dgm:spPr/>
     </dgm:pt>
-    <dgm:pt modelId="{DEC1F31D-8AAE-4503-B9A5-228719DF395E}" type="pres">
-      <dgm:prSet presAssocID="{57762566-40FF-4A75-AE35-E5873A1303D0}" presName="connectorText" presStyleLbl="sibTrans2D1" presStyleIdx="1" presStyleCnt="2"/>
+    <dgm:pt modelId="{0FA97E30-D59F-47E2-8C2F-7E47A22D1004}" type="pres">
+      <dgm:prSet presAssocID="{C6731D29-7BBA-4714-BAFF-45EAC202309B}" presName="connectorText" presStyleLbl="sibTrans2D1" presStyleIdx="1" presStyleCnt="2"/>
       <dgm:spPr/>
     </dgm:pt>
-    <dgm:pt modelId="{49A6E233-C123-4D26-B6F9-8FA95161F7F4}" type="pres">
-      <dgm:prSet presAssocID="{B936ED49-F1F2-4109-89EC-52CE0F90D65D}" presName="node" presStyleLbl="node1" presStyleIdx="2" presStyleCnt="3">
+    <dgm:pt modelId="{FD2C3100-A5E6-4F88-A5E3-795EF8F0B4AB}" type="pres">
+      <dgm:prSet presAssocID="{ED51EA2B-502E-4FF7-93E1-243E6405D8A7}" presName="node" presStyleLbl="node1" presStyleIdx="2" presStyleCnt="3">
         <dgm:presLayoutVars>
           <dgm:bulletEnabled val="1"/>
         </dgm:presLayoutVars>
@@ -1774,24 +1775,24 @@
     </dgm:pt>
   </dgm:ptLst>
   <dgm:cxnLst>
-    <dgm:cxn modelId="{B3841701-37F6-4BD9-9998-EF433C2C2C7E}" type="presOf" srcId="{57762566-40FF-4A75-AE35-E5873A1303D0}" destId="{DEC1F31D-8AAE-4503-B9A5-228719DF395E}" srcOrd="1" destOrd="0" presId="urn:microsoft.com/office/officeart/2005/8/layout/process1"/>
-    <dgm:cxn modelId="{A9BFC707-EC0A-4961-873F-1D4DC4FADF51}" srcId="{5F805F24-A7B5-4958-9589-E18A3F5F2938}" destId="{22A3833B-0BC2-4E32-97B7-2FEDFFC4F3DA}" srcOrd="0" destOrd="0" parTransId="{D42CE5B1-12D8-465C-882F-C30B57D77799}" sibTransId="{C85743DE-F4F7-4218-9505-C79FF336AF9C}"/>
-    <dgm:cxn modelId="{6DA0DE07-ABFE-426F-A5C7-5F317D795D82}" srcId="{5F805F24-A7B5-4958-9589-E18A3F5F2938}" destId="{B936ED49-F1F2-4109-89EC-52CE0F90D65D}" srcOrd="2" destOrd="0" parTransId="{386BA9D1-CF41-4020-8186-C4038C5F7470}" sibTransId="{B242CC7C-30FF-4407-898B-28EDF05C518C}"/>
-    <dgm:cxn modelId="{8269074A-842B-45E4-AC93-305BCB5326B0}" type="presOf" srcId="{22A3833B-0BC2-4E32-97B7-2FEDFFC4F3DA}" destId="{6D8BBAB4-09F7-4900-82A2-764A06B12B27}" srcOrd="0" destOrd="0" presId="urn:microsoft.com/office/officeart/2005/8/layout/process1"/>
-    <dgm:cxn modelId="{863DB04F-6B17-44DA-856E-5315CFA00F5C}" type="presOf" srcId="{5F805F24-A7B5-4958-9589-E18A3F5F2938}" destId="{8B0863AF-9722-45B0-BCB5-A479631E7106}" srcOrd="0" destOrd="0" presId="urn:microsoft.com/office/officeart/2005/8/layout/process1"/>
-    <dgm:cxn modelId="{08BF4576-6D41-4F1B-B148-D01F79D1F2BE}" type="presOf" srcId="{B936ED49-F1F2-4109-89EC-52CE0F90D65D}" destId="{49A6E233-C123-4D26-B6F9-8FA95161F7F4}" srcOrd="0" destOrd="0" presId="urn:microsoft.com/office/officeart/2005/8/layout/process1"/>
-    <dgm:cxn modelId="{CA50127A-1FA1-47E2-949C-BFCB29936161}" srcId="{5F805F24-A7B5-4958-9589-E18A3F5F2938}" destId="{3C1271AD-3592-4F31-A8B7-D990DDA75E6C}" srcOrd="1" destOrd="0" parTransId="{5F0D6EE3-E1A7-44AB-9D10-5BDDEAD71C0F}" sibTransId="{57762566-40FF-4A75-AE35-E5873A1303D0}"/>
-    <dgm:cxn modelId="{F4760A8E-E6D5-4A66-BAD3-86B769437F6A}" type="presOf" srcId="{C85743DE-F4F7-4218-9505-C79FF336AF9C}" destId="{F0F96126-198F-463E-A5B2-B26D69E111D9}" srcOrd="0" destOrd="0" presId="urn:microsoft.com/office/officeart/2005/8/layout/process1"/>
-    <dgm:cxn modelId="{4E3A47EF-0065-44FD-BEEB-8D1B46B2AA19}" type="presOf" srcId="{C85743DE-F4F7-4218-9505-C79FF336AF9C}" destId="{1ABD19B8-7CAC-4FC0-8CF2-C86820A88BD2}" srcOrd="1" destOrd="0" presId="urn:microsoft.com/office/officeart/2005/8/layout/process1"/>
-    <dgm:cxn modelId="{02EA1FF3-1C01-42F0-87C0-DE53E5754B8E}" type="presOf" srcId="{57762566-40FF-4A75-AE35-E5873A1303D0}" destId="{5C592176-504A-4D05-8069-F949DCE533BB}" srcOrd="0" destOrd="0" presId="urn:microsoft.com/office/officeart/2005/8/layout/process1"/>
-    <dgm:cxn modelId="{13836FF7-CFEA-42B9-8C96-2FFFA2B1C20A}" type="presOf" srcId="{3C1271AD-3592-4F31-A8B7-D990DDA75E6C}" destId="{E4960A1A-F9AC-4ED5-A131-9CD6BFA10817}" srcOrd="0" destOrd="0" presId="urn:microsoft.com/office/officeart/2005/8/layout/process1"/>
-    <dgm:cxn modelId="{0A9A07B0-F72C-4AB4-BC82-B03C5EF1859D}" type="presParOf" srcId="{8B0863AF-9722-45B0-BCB5-A479631E7106}" destId="{6D8BBAB4-09F7-4900-82A2-764A06B12B27}" srcOrd="0" destOrd="0" presId="urn:microsoft.com/office/officeart/2005/8/layout/process1"/>
-    <dgm:cxn modelId="{C7252E8C-E739-46DC-81AB-81AB496546C2}" type="presParOf" srcId="{8B0863AF-9722-45B0-BCB5-A479631E7106}" destId="{F0F96126-198F-463E-A5B2-B26D69E111D9}" srcOrd="1" destOrd="0" presId="urn:microsoft.com/office/officeart/2005/8/layout/process1"/>
-    <dgm:cxn modelId="{DA5B528B-422E-4685-83E5-E34ABFE04D36}" type="presParOf" srcId="{F0F96126-198F-463E-A5B2-B26D69E111D9}" destId="{1ABD19B8-7CAC-4FC0-8CF2-C86820A88BD2}" srcOrd="0" destOrd="0" presId="urn:microsoft.com/office/officeart/2005/8/layout/process1"/>
-    <dgm:cxn modelId="{8A7F5AB7-BE7E-476E-AC84-23DC1A9722BC}" type="presParOf" srcId="{8B0863AF-9722-45B0-BCB5-A479631E7106}" destId="{E4960A1A-F9AC-4ED5-A131-9CD6BFA10817}" srcOrd="2" destOrd="0" presId="urn:microsoft.com/office/officeart/2005/8/layout/process1"/>
-    <dgm:cxn modelId="{C3C22841-455E-4928-A167-08CC2CA0A984}" type="presParOf" srcId="{8B0863AF-9722-45B0-BCB5-A479631E7106}" destId="{5C592176-504A-4D05-8069-F949DCE533BB}" srcOrd="3" destOrd="0" presId="urn:microsoft.com/office/officeart/2005/8/layout/process1"/>
-    <dgm:cxn modelId="{79955761-C076-4A2F-A1BC-6E6B277D7FA1}" type="presParOf" srcId="{5C592176-504A-4D05-8069-F949DCE533BB}" destId="{DEC1F31D-8AAE-4503-B9A5-228719DF395E}" srcOrd="0" destOrd="0" presId="urn:microsoft.com/office/officeart/2005/8/layout/process1"/>
-    <dgm:cxn modelId="{E9573E90-FB8C-4BFC-B504-D27B69E82DD6}" type="presParOf" srcId="{8B0863AF-9722-45B0-BCB5-A479631E7106}" destId="{49A6E233-C123-4D26-B6F9-8FA95161F7F4}" srcOrd="4" destOrd="0" presId="urn:microsoft.com/office/officeart/2005/8/layout/process1"/>
+    <dgm:cxn modelId="{F85B6326-2F7A-4DA3-A13D-736442B12745}" type="presOf" srcId="{D6E57E89-6909-457C-9C2C-04A7F039A1CF}" destId="{C3029BB3-D346-4C95-8D95-61553A1E3CE8}" srcOrd="1" destOrd="0" presId="urn:microsoft.com/office/officeart/2005/8/layout/process2"/>
+    <dgm:cxn modelId="{8ABC4B3A-88B6-4176-849D-38A08DBD4F85}" type="presOf" srcId="{5873FF6C-D3FE-4997-8793-5B6C5BC3B860}" destId="{FBDB5662-0F45-4200-BC7C-4A256F6880EC}" srcOrd="0" destOrd="0" presId="urn:microsoft.com/office/officeart/2005/8/layout/process2"/>
+    <dgm:cxn modelId="{F905C83E-ACCF-411D-BAB0-BA78AFF8F3A9}" srcId="{C8CC17A4-8E74-42D4-BA15-632FB72F7115}" destId="{F58920D5-23CF-4768-9FB9-C85599FD1470}" srcOrd="1" destOrd="0" parTransId="{D838684F-D205-4D7B-B493-3FFFA570B8EF}" sibTransId="{C6731D29-7BBA-4714-BAFF-45EAC202309B}"/>
+    <dgm:cxn modelId="{68C5607B-F118-4E99-A6EC-698612A5B10C}" type="presOf" srcId="{C6731D29-7BBA-4714-BAFF-45EAC202309B}" destId="{0FA97E30-D59F-47E2-8C2F-7E47A22D1004}" srcOrd="1" destOrd="0" presId="urn:microsoft.com/office/officeart/2005/8/layout/process2"/>
+    <dgm:cxn modelId="{3FE78B9E-4602-4D29-8AA0-396B27D815A0}" type="presOf" srcId="{D6E57E89-6909-457C-9C2C-04A7F039A1CF}" destId="{1D81585D-8D2A-46FE-B2AE-EDE88F39D723}" srcOrd="0" destOrd="0" presId="urn:microsoft.com/office/officeart/2005/8/layout/process2"/>
+    <dgm:cxn modelId="{86C28CA4-19CD-46FF-A5BE-7B154305FDE5}" srcId="{C8CC17A4-8E74-42D4-BA15-632FB72F7115}" destId="{5873FF6C-D3FE-4997-8793-5B6C5BC3B860}" srcOrd="0" destOrd="0" parTransId="{30518536-EE78-4B63-ADB1-3CE1C780B910}" sibTransId="{D6E57E89-6909-457C-9C2C-04A7F039A1CF}"/>
+    <dgm:cxn modelId="{0D14A5A7-156E-4E49-94D1-5A504547C152}" srcId="{C8CC17A4-8E74-42D4-BA15-632FB72F7115}" destId="{ED51EA2B-502E-4FF7-93E1-243E6405D8A7}" srcOrd="2" destOrd="0" parTransId="{C62B16BC-2943-49F4-9393-1739F1D7CA5C}" sibTransId="{0B0102E1-0078-4C8D-929F-1AF3BEB2FA4B}"/>
+    <dgm:cxn modelId="{487A89A9-EEA5-4336-853A-F71B625094D7}" type="presOf" srcId="{C8CC17A4-8E74-42D4-BA15-632FB72F7115}" destId="{AB1D597E-8DE5-4422-8901-929706B3F80A}" srcOrd="0" destOrd="0" presId="urn:microsoft.com/office/officeart/2005/8/layout/process2"/>
+    <dgm:cxn modelId="{792A91D2-6E6F-4C71-96C6-8DECF682884B}" type="presOf" srcId="{C6731D29-7BBA-4714-BAFF-45EAC202309B}" destId="{A145DEA5-9128-4F31-8C33-507184A4CD23}" srcOrd="0" destOrd="0" presId="urn:microsoft.com/office/officeart/2005/8/layout/process2"/>
+    <dgm:cxn modelId="{6EF0C3D7-16A6-4080-AC64-E33FFAA966AA}" type="presOf" srcId="{F58920D5-23CF-4768-9FB9-C85599FD1470}" destId="{1BB1F1CC-93AA-42FB-AB75-D5A30BBB25D8}" srcOrd="0" destOrd="0" presId="urn:microsoft.com/office/officeart/2005/8/layout/process2"/>
+    <dgm:cxn modelId="{B4627FE8-5883-449C-A2C7-B2BF011E16C7}" type="presOf" srcId="{ED51EA2B-502E-4FF7-93E1-243E6405D8A7}" destId="{FD2C3100-A5E6-4F88-A5E3-795EF8F0B4AB}" srcOrd="0" destOrd="0" presId="urn:microsoft.com/office/officeart/2005/8/layout/process2"/>
+    <dgm:cxn modelId="{97B26911-2BAE-4C29-8528-1853928A3C73}" type="presParOf" srcId="{AB1D597E-8DE5-4422-8901-929706B3F80A}" destId="{FBDB5662-0F45-4200-BC7C-4A256F6880EC}" srcOrd="0" destOrd="0" presId="urn:microsoft.com/office/officeart/2005/8/layout/process2"/>
+    <dgm:cxn modelId="{B01B4871-5C70-4294-8570-D7534A728C3F}" type="presParOf" srcId="{AB1D597E-8DE5-4422-8901-929706B3F80A}" destId="{1D81585D-8D2A-46FE-B2AE-EDE88F39D723}" srcOrd="1" destOrd="0" presId="urn:microsoft.com/office/officeart/2005/8/layout/process2"/>
+    <dgm:cxn modelId="{F011E59E-FB3D-45EA-8F5E-21EDC71A5E72}" type="presParOf" srcId="{1D81585D-8D2A-46FE-B2AE-EDE88F39D723}" destId="{C3029BB3-D346-4C95-8D95-61553A1E3CE8}" srcOrd="0" destOrd="0" presId="urn:microsoft.com/office/officeart/2005/8/layout/process2"/>
+    <dgm:cxn modelId="{42C06137-D0DF-4900-A0A0-53A42F43EE8E}" type="presParOf" srcId="{AB1D597E-8DE5-4422-8901-929706B3F80A}" destId="{1BB1F1CC-93AA-42FB-AB75-D5A30BBB25D8}" srcOrd="2" destOrd="0" presId="urn:microsoft.com/office/officeart/2005/8/layout/process2"/>
+    <dgm:cxn modelId="{22575FBA-242E-41C4-AC92-D00948843A15}" type="presParOf" srcId="{AB1D597E-8DE5-4422-8901-929706B3F80A}" destId="{A145DEA5-9128-4F31-8C33-507184A4CD23}" srcOrd="3" destOrd="0" presId="urn:microsoft.com/office/officeart/2005/8/layout/process2"/>
+    <dgm:cxn modelId="{A24D07F1-D60A-488C-B4F3-15578C5456CE}" type="presParOf" srcId="{A145DEA5-9128-4F31-8C33-507184A4CD23}" destId="{0FA97E30-D59F-47E2-8C2F-7E47A22D1004}" srcOrd="0" destOrd="0" presId="urn:microsoft.com/office/officeart/2005/8/layout/process2"/>
+    <dgm:cxn modelId="{659346AB-1D83-4789-9ACD-CD8F41DB1BFA}" type="presParOf" srcId="{AB1D597E-8DE5-4422-8901-929706B3F80A}" destId="{FD2C3100-A5E6-4F88-A5E3-795EF8F0B4AB}" srcOrd="4" destOrd="0" presId="urn:microsoft.com/office/officeart/2005/8/layout/process2"/>
   </dgm:cxnLst>
   <dgm:bg/>
   <dgm:whole/>
@@ -1826,7 +1827,7 @@
         <a:p>
           <a:r>
             <a:rPr lang="en-US" dirty="0"/>
-            <a:t>IoT</a:t>
+            <a:t>Main</a:t>
           </a:r>
         </a:p>
       </dgm:t>
@@ -1970,7 +1971,7 @@
         <a:p>
           <a:r>
             <a:rPr lang="en-US" dirty="0"/>
-            <a:t>Inspect</a:t>
+            <a:t>Mill</a:t>
           </a:r>
         </a:p>
       </dgm:t>
@@ -2006,7 +2007,7 @@
         <a:p>
           <a:r>
             <a:rPr lang="en-US" dirty="0"/>
-            <a:t>Inspect</a:t>
+            <a:t>Mill</a:t>
           </a:r>
         </a:p>
       </dgm:t>
@@ -2033,42 +2034,6 @@
         </a:p>
       </dgm:t>
     </dgm:pt>
-    <dgm:pt modelId="{7F2873D4-64B1-4B2D-9F79-C9CC574059C3}">
-      <dgm:prSet phldrT="[Text]"/>
-      <dgm:spPr/>
-      <dgm:t>
-        <a:bodyPr/>
-        <a:lstStyle/>
-        <a:p>
-          <a:r>
-            <a:rPr lang="en-US" dirty="0"/>
-            <a:t>Inspect</a:t>
-          </a:r>
-        </a:p>
-      </dgm:t>
-    </dgm:pt>
-    <dgm:pt modelId="{675B464F-F4D2-4FA6-9044-C81E766AB9E7}" type="parTrans" cxnId="{0D2F1A59-9876-456D-ACCB-D8F0C7D01759}">
-      <dgm:prSet/>
-      <dgm:spPr/>
-      <dgm:t>
-        <a:bodyPr/>
-        <a:lstStyle/>
-        <a:p>
-          <a:endParaRPr lang="en-US"/>
-        </a:p>
-      </dgm:t>
-    </dgm:pt>
-    <dgm:pt modelId="{D85FD07F-65AC-4649-97D5-98F328BFFA19}" type="sibTrans" cxnId="{0D2F1A59-9876-456D-ACCB-D8F0C7D01759}">
-      <dgm:prSet/>
-      <dgm:spPr/>
-      <dgm:t>
-        <a:bodyPr/>
-        <a:lstStyle/>
-        <a:p>
-          <a:endParaRPr lang="en-US"/>
-        </a:p>
-      </dgm:t>
-    </dgm:pt>
     <dgm:pt modelId="{7C1965A4-3E02-4977-879C-4F968DB99FC0}" type="pres">
       <dgm:prSet presAssocID="{B2A3CAF4-C582-4F2A-ADC4-E7C41E183D46}" presName="cycle" presStyleCnt="0">
         <dgm:presLayoutVars>
@@ -2085,15 +2050,15 @@
       <dgm:spPr/>
     </dgm:pt>
     <dgm:pt modelId="{DD88F4BB-51C3-45DA-A7DF-8935ADFD539E}" type="pres">
-      <dgm:prSet presAssocID="{060506C1-B154-40DE-A238-DC76F5F7DB10}" presName="Name9" presStyleLbl="parChTrans1D2" presStyleIdx="0" presStyleCnt="6"/>
+      <dgm:prSet presAssocID="{060506C1-B154-40DE-A238-DC76F5F7DB10}" presName="Name9" presStyleLbl="parChTrans1D2" presStyleIdx="0" presStyleCnt="5"/>
       <dgm:spPr/>
     </dgm:pt>
     <dgm:pt modelId="{A97288F4-9C9D-4F7A-B0F8-7843F766EE7B}" type="pres">
-      <dgm:prSet presAssocID="{060506C1-B154-40DE-A238-DC76F5F7DB10}" presName="connTx" presStyleLbl="parChTrans1D2" presStyleIdx="0" presStyleCnt="6"/>
+      <dgm:prSet presAssocID="{060506C1-B154-40DE-A238-DC76F5F7DB10}" presName="connTx" presStyleLbl="parChTrans1D2" presStyleIdx="0" presStyleCnt="5"/>
       <dgm:spPr/>
     </dgm:pt>
     <dgm:pt modelId="{91D85305-0BEB-4081-937D-AA9856C21F1D}" type="pres">
-      <dgm:prSet presAssocID="{8713CB16-18E9-4639-B2B1-DB7129DA0119}" presName="node" presStyleLbl="node1" presStyleIdx="0" presStyleCnt="6">
+      <dgm:prSet presAssocID="{8713CB16-18E9-4639-B2B1-DB7129DA0119}" presName="node" presStyleLbl="node1" presStyleIdx="0" presStyleCnt="5">
         <dgm:presLayoutVars>
           <dgm:bulletEnabled val="1"/>
         </dgm:presLayoutVars>
@@ -2101,15 +2066,15 @@
       <dgm:spPr/>
     </dgm:pt>
     <dgm:pt modelId="{C9649257-D584-4E7E-98C2-9DD68751853B}" type="pres">
-      <dgm:prSet presAssocID="{4BE384A0-C5EF-445B-882C-818E6079752D}" presName="Name9" presStyleLbl="parChTrans1D2" presStyleIdx="1" presStyleCnt="6"/>
+      <dgm:prSet presAssocID="{4BE384A0-C5EF-445B-882C-818E6079752D}" presName="Name9" presStyleLbl="parChTrans1D2" presStyleIdx="1" presStyleCnt="5"/>
       <dgm:spPr/>
     </dgm:pt>
     <dgm:pt modelId="{6292B5B2-6FA9-45D5-8585-DCEA97ECF625}" type="pres">
-      <dgm:prSet presAssocID="{4BE384A0-C5EF-445B-882C-818E6079752D}" presName="connTx" presStyleLbl="parChTrans1D2" presStyleIdx="1" presStyleCnt="6"/>
+      <dgm:prSet presAssocID="{4BE384A0-C5EF-445B-882C-818E6079752D}" presName="connTx" presStyleLbl="parChTrans1D2" presStyleIdx="1" presStyleCnt="5"/>
       <dgm:spPr/>
     </dgm:pt>
     <dgm:pt modelId="{1969FD29-2861-483F-B98F-A06887FAA1AB}" type="pres">
-      <dgm:prSet presAssocID="{E69F9307-42C2-4F66-AB03-65B4C657C26A}" presName="node" presStyleLbl="node1" presStyleIdx="1" presStyleCnt="6">
+      <dgm:prSet presAssocID="{E69F9307-42C2-4F66-AB03-65B4C657C26A}" presName="node" presStyleLbl="node1" presStyleIdx="1" presStyleCnt="5">
         <dgm:presLayoutVars>
           <dgm:bulletEnabled val="1"/>
         </dgm:presLayoutVars>
@@ -2117,15 +2082,15 @@
       <dgm:spPr/>
     </dgm:pt>
     <dgm:pt modelId="{2652E8EA-740B-4638-861B-94C19CBD20FB}" type="pres">
-      <dgm:prSet presAssocID="{129944CD-B63E-464D-9273-C4D8D673E5BC}" presName="Name9" presStyleLbl="parChTrans1D2" presStyleIdx="2" presStyleCnt="6"/>
+      <dgm:prSet presAssocID="{129944CD-B63E-464D-9273-C4D8D673E5BC}" presName="Name9" presStyleLbl="parChTrans1D2" presStyleIdx="2" presStyleCnt="5"/>
       <dgm:spPr/>
     </dgm:pt>
     <dgm:pt modelId="{00B146FB-704E-44D0-BC5E-23E2E6DA51CD}" type="pres">
-      <dgm:prSet presAssocID="{129944CD-B63E-464D-9273-C4D8D673E5BC}" presName="connTx" presStyleLbl="parChTrans1D2" presStyleIdx="2" presStyleCnt="6"/>
+      <dgm:prSet presAssocID="{129944CD-B63E-464D-9273-C4D8D673E5BC}" presName="connTx" presStyleLbl="parChTrans1D2" presStyleIdx="2" presStyleCnt="5"/>
       <dgm:spPr/>
     </dgm:pt>
     <dgm:pt modelId="{A8809457-BD18-4BD7-845E-9332A0605F7E}" type="pres">
-      <dgm:prSet presAssocID="{93905B40-4A41-4C4B-92B1-3119F6E197FF}" presName="node" presStyleLbl="node1" presStyleIdx="2" presStyleCnt="6">
+      <dgm:prSet presAssocID="{93905B40-4A41-4C4B-92B1-3119F6E197FF}" presName="node" presStyleLbl="node1" presStyleIdx="2" presStyleCnt="5">
         <dgm:presLayoutVars>
           <dgm:bulletEnabled val="1"/>
         </dgm:presLayoutVars>
@@ -2133,15 +2098,15 @@
       <dgm:spPr/>
     </dgm:pt>
     <dgm:pt modelId="{03A2BED5-0017-41B0-9066-1C32BE7DD2D4}" type="pres">
-      <dgm:prSet presAssocID="{6DC9B205-3C22-4AD0-A0CA-1D191EE48985}" presName="Name9" presStyleLbl="parChTrans1D2" presStyleIdx="3" presStyleCnt="6"/>
+      <dgm:prSet presAssocID="{6DC9B205-3C22-4AD0-A0CA-1D191EE48985}" presName="Name9" presStyleLbl="parChTrans1D2" presStyleIdx="3" presStyleCnt="5"/>
       <dgm:spPr/>
     </dgm:pt>
     <dgm:pt modelId="{BE9B9705-20CF-4D14-AE03-C368E6E5EA6B}" type="pres">
-      <dgm:prSet presAssocID="{6DC9B205-3C22-4AD0-A0CA-1D191EE48985}" presName="connTx" presStyleLbl="parChTrans1D2" presStyleIdx="3" presStyleCnt="6"/>
+      <dgm:prSet presAssocID="{6DC9B205-3C22-4AD0-A0CA-1D191EE48985}" presName="connTx" presStyleLbl="parChTrans1D2" presStyleIdx="3" presStyleCnt="5"/>
       <dgm:spPr/>
     </dgm:pt>
     <dgm:pt modelId="{5A9F9BA0-9F60-461A-99A7-56018E4F7CA4}" type="pres">
-      <dgm:prSet presAssocID="{3179FBF2-EC8C-4953-BB27-064826757454}" presName="node" presStyleLbl="node1" presStyleIdx="3" presStyleCnt="6">
+      <dgm:prSet presAssocID="{3179FBF2-EC8C-4953-BB27-064826757454}" presName="node" presStyleLbl="node1" presStyleIdx="3" presStyleCnt="5">
         <dgm:presLayoutVars>
           <dgm:bulletEnabled val="1"/>
         </dgm:presLayoutVars>
@@ -2149,31 +2114,15 @@
       <dgm:spPr/>
     </dgm:pt>
     <dgm:pt modelId="{BA1C512C-4E07-4BD6-A98C-4464F32E3D7F}" type="pres">
-      <dgm:prSet presAssocID="{9F9CA228-86DA-4997-83D9-BFA3CCDC21A9}" presName="Name9" presStyleLbl="parChTrans1D2" presStyleIdx="4" presStyleCnt="6"/>
+      <dgm:prSet presAssocID="{9F9CA228-86DA-4997-83D9-BFA3CCDC21A9}" presName="Name9" presStyleLbl="parChTrans1D2" presStyleIdx="4" presStyleCnt="5"/>
       <dgm:spPr/>
     </dgm:pt>
     <dgm:pt modelId="{DC6D2C7D-C59E-42A0-8306-83D80ED99EE2}" type="pres">
-      <dgm:prSet presAssocID="{9F9CA228-86DA-4997-83D9-BFA3CCDC21A9}" presName="connTx" presStyleLbl="parChTrans1D2" presStyleIdx="4" presStyleCnt="6"/>
+      <dgm:prSet presAssocID="{9F9CA228-86DA-4997-83D9-BFA3CCDC21A9}" presName="connTx" presStyleLbl="parChTrans1D2" presStyleIdx="4" presStyleCnt="5"/>
       <dgm:spPr/>
     </dgm:pt>
     <dgm:pt modelId="{0F5229CA-9F41-4048-BBE1-43E7C3E0A101}" type="pres">
-      <dgm:prSet presAssocID="{24212C2E-AA04-429E-8107-082AEA503D92}" presName="node" presStyleLbl="node1" presStyleIdx="4" presStyleCnt="6">
-        <dgm:presLayoutVars>
-          <dgm:bulletEnabled val="1"/>
-        </dgm:presLayoutVars>
-      </dgm:prSet>
-      <dgm:spPr/>
-    </dgm:pt>
-    <dgm:pt modelId="{F3ED839C-4984-4D6D-86CB-7F036EDBD460}" type="pres">
-      <dgm:prSet presAssocID="{675B464F-F4D2-4FA6-9044-C81E766AB9E7}" presName="Name9" presStyleLbl="parChTrans1D2" presStyleIdx="5" presStyleCnt="6"/>
-      <dgm:spPr/>
-    </dgm:pt>
-    <dgm:pt modelId="{041A894B-7B70-4B4F-9EA0-3542211B357D}" type="pres">
-      <dgm:prSet presAssocID="{675B464F-F4D2-4FA6-9044-C81E766AB9E7}" presName="connTx" presStyleLbl="parChTrans1D2" presStyleIdx="5" presStyleCnt="6"/>
-      <dgm:spPr/>
-    </dgm:pt>
-    <dgm:pt modelId="{E4ADA844-DB69-474D-B21C-A2FE5BB49D84}" type="pres">
-      <dgm:prSet presAssocID="{7F2873D4-64B1-4B2D-9F79-C9CC574059C3}" presName="node" presStyleLbl="node1" presStyleIdx="5" presStyleCnt="6">
+      <dgm:prSet presAssocID="{24212C2E-AA04-429E-8107-082AEA503D92}" presName="node" presStyleLbl="node1" presStyleIdx="4" presStyleCnt="5">
         <dgm:presLayoutVars>
           <dgm:bulletEnabled val="1"/>
         </dgm:presLayoutVars>
@@ -2185,23 +2134,19 @@
     <dgm:cxn modelId="{1715EE0B-0D21-473B-BB3C-989B22C6775B}" type="presOf" srcId="{36D54CAB-ED7A-44F9-8364-717850840674}" destId="{7292429F-F1F7-4FDA-A7CE-5E82158F8DDB}" srcOrd="0" destOrd="0" presId="urn:microsoft.com/office/officeart/2005/8/layout/radial1"/>
     <dgm:cxn modelId="{0CB0F137-BD70-41C0-9EC2-7C599D2A9C23}" srcId="{36D54CAB-ED7A-44F9-8364-717850840674}" destId="{24212C2E-AA04-429E-8107-082AEA503D92}" srcOrd="4" destOrd="0" parTransId="{9F9CA228-86DA-4997-83D9-BFA3CCDC21A9}" sibTransId="{11C6E66E-AECE-48B7-A708-E3F980C838E3}"/>
     <dgm:cxn modelId="{CE8BB05B-A5BC-440C-AF84-483D13C96ACF}" type="presOf" srcId="{060506C1-B154-40DE-A238-DC76F5F7DB10}" destId="{DD88F4BB-51C3-45DA-A7DF-8935ADFD539E}" srcOrd="0" destOrd="0" presId="urn:microsoft.com/office/officeart/2005/8/layout/radial1"/>
-    <dgm:cxn modelId="{D0754644-DFFE-465E-9301-28268A8746E0}" type="presOf" srcId="{675B464F-F4D2-4FA6-9044-C81E766AB9E7}" destId="{041A894B-7B70-4B4F-9EA0-3542211B357D}" srcOrd="1" destOrd="0" presId="urn:microsoft.com/office/officeart/2005/8/layout/radial1"/>
     <dgm:cxn modelId="{91681266-1CDD-4362-9D84-8A410840ABF8}" type="presOf" srcId="{129944CD-B63E-464D-9273-C4D8D673E5BC}" destId="{00B146FB-704E-44D0-BC5E-23E2E6DA51CD}" srcOrd="1" destOrd="0" presId="urn:microsoft.com/office/officeart/2005/8/layout/radial1"/>
     <dgm:cxn modelId="{306C014C-BB1B-4C03-BB93-06E535E12CAD}" type="presOf" srcId="{6DC9B205-3C22-4AD0-A0CA-1D191EE48985}" destId="{03A2BED5-0017-41B0-9066-1C32BE7DD2D4}" srcOrd="0" destOrd="0" presId="urn:microsoft.com/office/officeart/2005/8/layout/radial1"/>
     <dgm:cxn modelId="{F27C1C6F-5EC3-4E58-BEEE-BF9F2080F312}" type="presOf" srcId="{4BE384A0-C5EF-445B-882C-818E6079752D}" destId="{6292B5B2-6FA9-45D5-8585-DCEA97ECF625}" srcOrd="1" destOrd="0" presId="urn:microsoft.com/office/officeart/2005/8/layout/radial1"/>
     <dgm:cxn modelId="{43583E74-1A91-4047-A21C-802BEBE5FCFE}" srcId="{36D54CAB-ED7A-44F9-8364-717850840674}" destId="{E69F9307-42C2-4F66-AB03-65B4C657C26A}" srcOrd="1" destOrd="0" parTransId="{4BE384A0-C5EF-445B-882C-818E6079752D}" sibTransId="{8876459A-B6CC-442B-BA60-F8EC9186E3AA}"/>
     <dgm:cxn modelId="{82D19956-D5EC-4DA5-9865-A98B90E044B9}" type="presOf" srcId="{4BE384A0-C5EF-445B-882C-818E6079752D}" destId="{C9649257-D584-4E7E-98C2-9DD68751853B}" srcOrd="0" destOrd="0" presId="urn:microsoft.com/office/officeart/2005/8/layout/radial1"/>
-    <dgm:cxn modelId="{0D2F1A59-9876-456D-ACCB-D8F0C7D01759}" srcId="{36D54CAB-ED7A-44F9-8364-717850840674}" destId="{7F2873D4-64B1-4B2D-9F79-C9CC574059C3}" srcOrd="5" destOrd="0" parTransId="{675B464F-F4D2-4FA6-9044-C81E766AB9E7}" sibTransId="{D85FD07F-65AC-4649-97D5-98F328BFFA19}"/>
     <dgm:cxn modelId="{EE0C3559-65D9-4D1E-B210-0B0A2195FD2B}" srcId="{36D54CAB-ED7A-44F9-8364-717850840674}" destId="{93905B40-4A41-4C4B-92B1-3119F6E197FF}" srcOrd="2" destOrd="0" parTransId="{129944CD-B63E-464D-9273-C4D8D673E5BC}" sibTransId="{76661D34-08F0-4F4E-ABB6-81658C571B51}"/>
     <dgm:cxn modelId="{EA0EB380-9C88-431C-9B3C-B792CCC95CD7}" srcId="{36D54CAB-ED7A-44F9-8364-717850840674}" destId="{8713CB16-18E9-4639-B2B1-DB7129DA0119}" srcOrd="0" destOrd="0" parTransId="{060506C1-B154-40DE-A238-DC76F5F7DB10}" sibTransId="{E3DE89E1-40D5-4C1D-9D63-E384E4D83BB6}"/>
     <dgm:cxn modelId="{10B7938B-0E9A-4F14-92BF-2225BFBF31C9}" type="presOf" srcId="{8713CB16-18E9-4639-B2B1-DB7129DA0119}" destId="{91D85305-0BEB-4081-937D-AA9856C21F1D}" srcOrd="0" destOrd="0" presId="urn:microsoft.com/office/officeart/2005/8/layout/radial1"/>
     <dgm:cxn modelId="{EC5AAF8C-E646-4B90-A3AB-CBBD81E1856C}" type="presOf" srcId="{24212C2E-AA04-429E-8107-082AEA503D92}" destId="{0F5229CA-9F41-4048-BBE1-43E7C3E0A101}" srcOrd="0" destOrd="0" presId="urn:microsoft.com/office/officeart/2005/8/layout/radial1"/>
-    <dgm:cxn modelId="{93B21791-D265-4BAC-AB09-D626F36C8C44}" type="presOf" srcId="{7F2873D4-64B1-4B2D-9F79-C9CC574059C3}" destId="{E4ADA844-DB69-474D-B21C-A2FE5BB49D84}" srcOrd="0" destOrd="0" presId="urn:microsoft.com/office/officeart/2005/8/layout/radial1"/>
     <dgm:cxn modelId="{14D26A92-0E6E-4E18-9213-9CEC9E839694}" srcId="{36D54CAB-ED7A-44F9-8364-717850840674}" destId="{3179FBF2-EC8C-4953-BB27-064826757454}" srcOrd="3" destOrd="0" parTransId="{6DC9B205-3C22-4AD0-A0CA-1D191EE48985}" sibTransId="{C1E9F35E-ACD5-4E2E-8687-6E123CCFA84F}"/>
     <dgm:cxn modelId="{96EA8793-74AB-45EB-A7EE-83F4E30DD310}" type="presOf" srcId="{B2A3CAF4-C582-4F2A-ADC4-E7C41E183D46}" destId="{7C1965A4-3E02-4977-879C-4F968DB99FC0}" srcOrd="0" destOrd="0" presId="urn:microsoft.com/office/officeart/2005/8/layout/radial1"/>
     <dgm:cxn modelId="{920A339A-5874-40B5-B5A8-E3F6EDF0847F}" type="presOf" srcId="{9F9CA228-86DA-4997-83D9-BFA3CCDC21A9}" destId="{BA1C512C-4E07-4BD6-A98C-4464F32E3D7F}" srcOrd="0" destOrd="0" presId="urn:microsoft.com/office/officeart/2005/8/layout/radial1"/>
     <dgm:cxn modelId="{F4135CA3-945E-4CBD-9890-9A6DC2B7B9B0}" type="presOf" srcId="{93905B40-4A41-4C4B-92B1-3119F6E197FF}" destId="{A8809457-BD18-4BD7-845E-9332A0605F7E}" srcOrd="0" destOrd="0" presId="urn:microsoft.com/office/officeart/2005/8/layout/radial1"/>
-    <dgm:cxn modelId="{7887D9A9-415A-483F-9B45-47DE7CEB6B78}" type="presOf" srcId="{675B464F-F4D2-4FA6-9044-C81E766AB9E7}" destId="{F3ED839C-4984-4D6D-86CB-7F036EDBD460}" srcOrd="0" destOrd="0" presId="urn:microsoft.com/office/officeart/2005/8/layout/radial1"/>
     <dgm:cxn modelId="{1F5497B7-F0C4-4766-A803-5DE5A5756CD4}" type="presOf" srcId="{060506C1-B154-40DE-A238-DC76F5F7DB10}" destId="{A97288F4-9C9D-4F7A-B0F8-7843F766EE7B}" srcOrd="1" destOrd="0" presId="urn:microsoft.com/office/officeart/2005/8/layout/radial1"/>
     <dgm:cxn modelId="{654EDEB9-6958-4324-8783-307C64A837F4}" type="presOf" srcId="{9F9CA228-86DA-4997-83D9-BFA3CCDC21A9}" destId="{DC6D2C7D-C59E-42A0-8306-83D80ED99EE2}" srcOrd="1" destOrd="0" presId="urn:microsoft.com/office/officeart/2005/8/layout/radial1"/>
     <dgm:cxn modelId="{64D74AC2-B5E5-461C-921B-619E01249315}" type="presOf" srcId="{3179FBF2-EC8C-4953-BB27-064826757454}" destId="{5A9F9BA0-9F60-461A-99A7-56018E4F7CA4}" srcOrd="0" destOrd="0" presId="urn:microsoft.com/office/officeart/2005/8/layout/radial1"/>
@@ -2225,9 +2170,6 @@
     <dgm:cxn modelId="{8A5538E3-C87F-4D37-8FD9-26204C62B999}" type="presParOf" srcId="{7C1965A4-3E02-4977-879C-4F968DB99FC0}" destId="{BA1C512C-4E07-4BD6-A98C-4464F32E3D7F}" srcOrd="9" destOrd="0" presId="urn:microsoft.com/office/officeart/2005/8/layout/radial1"/>
     <dgm:cxn modelId="{5B919627-1177-463F-AC25-CF7C3A505934}" type="presParOf" srcId="{BA1C512C-4E07-4BD6-A98C-4464F32E3D7F}" destId="{DC6D2C7D-C59E-42A0-8306-83D80ED99EE2}" srcOrd="0" destOrd="0" presId="urn:microsoft.com/office/officeart/2005/8/layout/radial1"/>
     <dgm:cxn modelId="{3DD0976C-6567-4EBB-8FF3-962D3A56F54F}" type="presParOf" srcId="{7C1965A4-3E02-4977-879C-4F968DB99FC0}" destId="{0F5229CA-9F41-4048-BBE1-43E7C3E0A101}" srcOrd="10" destOrd="0" presId="urn:microsoft.com/office/officeart/2005/8/layout/radial1"/>
-    <dgm:cxn modelId="{CDC69023-3111-415F-A3E9-2C412E85830F}" type="presParOf" srcId="{7C1965A4-3E02-4977-879C-4F968DB99FC0}" destId="{F3ED839C-4984-4D6D-86CB-7F036EDBD460}" srcOrd="11" destOrd="0" presId="urn:microsoft.com/office/officeart/2005/8/layout/radial1"/>
-    <dgm:cxn modelId="{2378EC89-2F11-47E4-9F03-5ACDE7692DCD}" type="presParOf" srcId="{F3ED839C-4984-4D6D-86CB-7F036EDBD460}" destId="{041A894B-7B70-4B4F-9EA0-3542211B357D}" srcOrd="0" destOrd="0" presId="urn:microsoft.com/office/officeart/2005/8/layout/radial1"/>
-    <dgm:cxn modelId="{BD227F11-8C62-4F3B-8D0A-CEAFEC15CEAD}" type="presParOf" srcId="{7C1965A4-3E02-4977-879C-4F968DB99FC0}" destId="{E4ADA844-DB69-474D-B21C-A2FE5BB49D84}" srcOrd="12" destOrd="0" presId="urn:microsoft.com/office/officeart/2005/8/layout/radial1"/>
   </dgm:cxnLst>
   <dgm:bg/>
   <dgm:whole/>
@@ -2247,15 +2189,15 @@
       <dsp:cNvGrpSpPr/>
     </dsp:nvGrpSpPr>
     <dsp:grpSpPr/>
-    <dsp:sp modelId="{6D8BBAB4-09F7-4900-82A2-764A06B12B27}">
+    <dsp:sp modelId="{FBDB5662-0F45-4200-BC7C-4A256F6880EC}">
       <dsp:nvSpPr>
         <dsp:cNvPr id="0" name=""/>
         <dsp:cNvSpPr/>
       </dsp:nvSpPr>
       <dsp:spPr>
         <a:xfrm>
-          <a:off x="4129" y="892057"/>
-          <a:ext cx="1234405" cy="740643"/>
+          <a:off x="1634529" y="0"/>
+          <a:ext cx="1993820" cy="1107677"/>
         </a:xfrm>
         <a:prstGeom prst="roundRect">
           <a:avLst>
@@ -2299,12 +2241,12 @@
         </a:fontRef>
       </dsp:style>
       <dsp:txBody>
-        <a:bodyPr spcFirstLastPara="0" vert="horz" wrap="square" lIns="91440" tIns="91440" rIns="91440" bIns="91440" numCol="1" spcCol="1270" anchor="ctr" anchorCtr="0">
+        <a:bodyPr spcFirstLastPara="0" vert="horz" wrap="square" lIns="182880" tIns="182880" rIns="182880" bIns="182880" numCol="1" spcCol="1270" anchor="ctr" anchorCtr="0">
           <a:noAutofit/>
         </a:bodyPr>
         <a:lstStyle/>
         <a:p>
-          <a:pPr marL="0" lvl="0" indent="0" algn="ctr" defTabSz="1066800">
+          <a:pPr marL="0" lvl="0" indent="0" algn="ctr" defTabSz="2133600">
             <a:lnSpc>
               <a:spcPct val="90000"/>
             </a:lnSpc>
@@ -2317,25 +2259,25 @@
             <a:buNone/>
           </a:pPr>
           <a:r>
-            <a:rPr lang="en-US" sz="2400" kern="1200" dirty="0"/>
-            <a:t>Job</a:t>
+            <a:rPr lang="en-US" sz="4800" kern="1200" dirty="0"/>
+            <a:t>Block</a:t>
           </a:r>
         </a:p>
       </dsp:txBody>
       <dsp:txXfrm>
-        <a:off x="25822" y="913750"/>
-        <a:ext cx="1191019" cy="697257"/>
+        <a:off x="1666972" y="32443"/>
+        <a:ext cx="1928934" cy="1042791"/>
       </dsp:txXfrm>
     </dsp:sp>
-    <dsp:sp modelId="{F0F96126-198F-463E-A5B2-B26D69E111D9}">
+    <dsp:sp modelId="{1D81585D-8D2A-46FE-B2AE-EDE88F39D723}">
       <dsp:nvSpPr>
         <dsp:cNvPr id="0" name=""/>
         <dsp:cNvSpPr/>
       </dsp:nvSpPr>
       <dsp:spPr>
-        <a:xfrm>
-          <a:off x="1361975" y="1109313"/>
-          <a:ext cx="261693" cy="306132"/>
+        <a:xfrm rot="5400000">
+          <a:off x="2423750" y="1135369"/>
+          <a:ext cx="415379" cy="498455"/>
         </a:xfrm>
         <a:prstGeom prst="rightArrow">
           <a:avLst>
@@ -2377,7 +2319,7 @@
         </a:bodyPr>
         <a:lstStyle/>
         <a:p>
-          <a:pPr marL="0" lvl="0" indent="0" algn="ctr" defTabSz="577850">
+          <a:pPr marL="0" lvl="0" indent="0" algn="ctr" defTabSz="889000">
             <a:lnSpc>
               <a:spcPct val="90000"/>
             </a:lnSpc>
@@ -2389,23 +2331,23 @@
             </a:spcAft>
             <a:buNone/>
           </a:pPr>
-          <a:endParaRPr lang="en-US" sz="1300" kern="1200"/>
+          <a:endParaRPr lang="en-US" sz="2000" kern="1200"/>
         </a:p>
       </dsp:txBody>
-      <dsp:txXfrm>
-        <a:off x="1361975" y="1170539"/>
-        <a:ext cx="183185" cy="183680"/>
+      <dsp:txXfrm rot="-5400000">
+        <a:off x="2481903" y="1176907"/>
+        <a:ext cx="299073" cy="290765"/>
       </dsp:txXfrm>
     </dsp:sp>
-    <dsp:sp modelId="{E4960A1A-F9AC-4ED5-A131-9CD6BFA10817}">
+    <dsp:sp modelId="{1BB1F1CC-93AA-42FB-AB75-D5A30BBB25D8}">
       <dsp:nvSpPr>
         <dsp:cNvPr id="0" name=""/>
         <dsp:cNvSpPr/>
       </dsp:nvSpPr>
       <dsp:spPr>
         <a:xfrm>
-          <a:off x="1732297" y="892057"/>
-          <a:ext cx="1234405" cy="740643"/>
+          <a:off x="1634529" y="1661517"/>
+          <a:ext cx="1993820" cy="1107677"/>
         </a:xfrm>
         <a:prstGeom prst="roundRect">
           <a:avLst>
@@ -2449,12 +2391,12 @@
         </a:fontRef>
       </dsp:style>
       <dsp:txBody>
-        <a:bodyPr spcFirstLastPara="0" vert="horz" wrap="square" lIns="91440" tIns="91440" rIns="91440" bIns="91440" numCol="1" spcCol="1270" anchor="ctr" anchorCtr="0">
+        <a:bodyPr spcFirstLastPara="0" vert="horz" wrap="square" lIns="182880" tIns="182880" rIns="182880" bIns="182880" numCol="1" spcCol="1270" anchor="ctr" anchorCtr="0">
           <a:noAutofit/>
         </a:bodyPr>
         <a:lstStyle/>
         <a:p>
-          <a:pPr marL="0" lvl="0" indent="0" algn="ctr" defTabSz="1066800">
+          <a:pPr marL="0" lvl="0" indent="0" algn="ctr" defTabSz="2133600">
             <a:lnSpc>
               <a:spcPct val="90000"/>
             </a:lnSpc>
@@ -2467,25 +2409,25 @@
             <a:buNone/>
           </a:pPr>
           <a:r>
-            <a:rPr lang="en-US" sz="2400" kern="1200" dirty="0"/>
+            <a:rPr lang="en-US" sz="4800" kern="1200" dirty="0"/>
             <a:t>Mill</a:t>
           </a:r>
         </a:p>
       </dsp:txBody>
       <dsp:txXfrm>
-        <a:off x="1753990" y="913750"/>
-        <a:ext cx="1191019" cy="697257"/>
+        <a:off x="1666972" y="1693960"/>
+        <a:ext cx="1928934" cy="1042791"/>
       </dsp:txXfrm>
     </dsp:sp>
-    <dsp:sp modelId="{5C592176-504A-4D05-8069-F949DCE533BB}">
+    <dsp:sp modelId="{A145DEA5-9128-4F31-8C33-507184A4CD23}">
       <dsp:nvSpPr>
         <dsp:cNvPr id="0" name=""/>
         <dsp:cNvSpPr/>
       </dsp:nvSpPr>
       <dsp:spPr>
-        <a:xfrm>
-          <a:off x="3090143" y="1109313"/>
-          <a:ext cx="261693" cy="306132"/>
+        <a:xfrm rot="5400000">
+          <a:off x="2423750" y="2796886"/>
+          <a:ext cx="415379" cy="498455"/>
         </a:xfrm>
         <a:prstGeom prst="rightArrow">
           <a:avLst>
@@ -2527,7 +2469,7 @@
         </a:bodyPr>
         <a:lstStyle/>
         <a:p>
-          <a:pPr marL="0" lvl="0" indent="0" algn="ctr" defTabSz="577850">
+          <a:pPr marL="0" lvl="0" indent="0" algn="ctr" defTabSz="889000">
             <a:lnSpc>
               <a:spcPct val="90000"/>
             </a:lnSpc>
@@ -2539,23 +2481,23 @@
             </a:spcAft>
             <a:buNone/>
           </a:pPr>
-          <a:endParaRPr lang="en-US" sz="1300" kern="1200"/>
+          <a:endParaRPr lang="en-US" sz="2000" kern="1200"/>
         </a:p>
       </dsp:txBody>
-      <dsp:txXfrm>
-        <a:off x="3090143" y="1170539"/>
-        <a:ext cx="183185" cy="183680"/>
+      <dsp:txXfrm rot="-5400000">
+        <a:off x="2481903" y="2838424"/>
+        <a:ext cx="299073" cy="290765"/>
       </dsp:txXfrm>
     </dsp:sp>
-    <dsp:sp modelId="{49A6E233-C123-4D26-B6F9-8FA95161F7F4}">
+    <dsp:sp modelId="{FD2C3100-A5E6-4F88-A5E3-795EF8F0B4AB}">
       <dsp:nvSpPr>
         <dsp:cNvPr id="0" name=""/>
         <dsp:cNvSpPr/>
       </dsp:nvSpPr>
       <dsp:spPr>
         <a:xfrm>
-          <a:off x="3460464" y="892057"/>
-          <a:ext cx="1234405" cy="740643"/>
+          <a:off x="1634529" y="3323034"/>
+          <a:ext cx="1993820" cy="1107677"/>
         </a:xfrm>
         <a:prstGeom prst="roundRect">
           <a:avLst>
@@ -2599,12 +2541,12 @@
         </a:fontRef>
       </dsp:style>
       <dsp:txBody>
-        <a:bodyPr spcFirstLastPara="0" vert="horz" wrap="square" lIns="91440" tIns="91440" rIns="91440" bIns="91440" numCol="1" spcCol="1270" anchor="ctr" anchorCtr="0">
+        <a:bodyPr spcFirstLastPara="0" vert="horz" wrap="square" lIns="182880" tIns="182880" rIns="182880" bIns="182880" numCol="1" spcCol="1270" anchor="ctr" anchorCtr="0">
           <a:noAutofit/>
         </a:bodyPr>
         <a:lstStyle/>
         <a:p>
-          <a:pPr marL="0" lvl="0" indent="0" algn="ctr" defTabSz="1066800">
+          <a:pPr marL="0" lvl="0" indent="0" algn="ctr" defTabSz="2133600">
             <a:lnSpc>
               <a:spcPct val="90000"/>
             </a:lnSpc>
@@ -2617,14 +2559,14 @@
             <a:buNone/>
           </a:pPr>
           <a:r>
-            <a:rPr lang="en-US" sz="2400" kern="1200" dirty="0"/>
-            <a:t>Inspect</a:t>
+            <a:rPr lang="en-US" sz="4800" kern="1200" dirty="0"/>
+            <a:t>Tooth</a:t>
           </a:r>
         </a:p>
       </dsp:txBody>
       <dsp:txXfrm>
-        <a:off x="3482157" y="913750"/>
-        <a:ext cx="1191019" cy="697257"/>
+        <a:off x="1666972" y="3355477"/>
+        <a:ext cx="1928934" cy="1042791"/>
       </dsp:txXfrm>
     </dsp:sp>
   </dsp:spTree>
@@ -2646,8 +2588,8 @@
       </dsp:nvSpPr>
       <dsp:spPr>
         <a:xfrm>
-          <a:off x="2363648" y="1620318"/>
-          <a:ext cx="1211223" cy="1211223"/>
+          <a:off x="2313935" y="1735530"/>
+          <a:ext cx="1310649" cy="1310649"/>
         </a:xfrm>
         <a:prstGeom prst="ellipse">
           <a:avLst/>
@@ -2716,12 +2658,12 @@
         </a:fontRef>
       </dsp:style>
       <dsp:txBody>
-        <a:bodyPr spcFirstLastPara="0" vert="horz" wrap="square" lIns="32385" tIns="32385" rIns="32385" bIns="32385" numCol="1" spcCol="1270" anchor="ctr" anchorCtr="0">
+        <a:bodyPr spcFirstLastPara="0" vert="horz" wrap="square" lIns="20955" tIns="20955" rIns="20955" bIns="20955" numCol="1" spcCol="1270" anchor="ctr" anchorCtr="0">
           <a:noAutofit/>
         </a:bodyPr>
         <a:lstStyle/>
         <a:p>
-          <a:pPr marL="0" lvl="0" indent="0" algn="ctr" defTabSz="2266950">
+          <a:pPr marL="0" lvl="0" indent="0" algn="ctr" defTabSz="1466850">
             <a:lnSpc>
               <a:spcPct val="90000"/>
             </a:lnSpc>
@@ -2734,14 +2676,14 @@
             <a:buNone/>
           </a:pPr>
           <a:r>
-            <a:rPr lang="en-US" sz="5100" kern="1200" dirty="0"/>
-            <a:t>IoT</a:t>
+            <a:rPr lang="en-US" sz="3300" kern="1200" dirty="0"/>
+            <a:t>Main</a:t>
           </a:r>
         </a:p>
       </dsp:txBody>
       <dsp:txXfrm>
-        <a:off x="2541028" y="1797698"/>
-        <a:ext cx="856463" cy="856463"/>
+        <a:off x="2505875" y="1927470"/>
+        <a:ext cx="926769" cy="926769"/>
       </dsp:txXfrm>
     </dsp:sp>
     <dsp:sp modelId="{DD88F4BB-51C3-45DA-A7DF-8935ADFD539E}">
@@ -2751,8 +2693,8 @@
       </dsp:nvSpPr>
       <dsp:spPr>
         <a:xfrm rot="16200000">
-          <a:off x="2772971" y="1405673"/>
-          <a:ext cx="392577" cy="36712"/>
+          <a:off x="2757838" y="1504245"/>
+          <a:ext cx="422843" cy="39726"/>
         </a:xfrm>
         <a:custGeom>
           <a:avLst/>
@@ -2763,10 +2705,10 @@
           <a:pathLst>
             <a:path>
               <a:moveTo>
-                <a:pt x="0" y="18356"/>
+                <a:pt x="0" y="19863"/>
               </a:moveTo>
               <a:lnTo>
-                <a:pt x="392577" y="18356"/>
+                <a:pt x="422843" y="19863"/>
               </a:lnTo>
             </a:path>
           </a:pathLst>
@@ -2821,8 +2763,8 @@
         </a:p>
       </dsp:txBody>
       <dsp:txXfrm>
-        <a:off x="2959445" y="1414215"/>
-        <a:ext cx="19628" cy="19628"/>
+        <a:off x="2958688" y="1513537"/>
+        <a:ext cx="21142" cy="21142"/>
       </dsp:txXfrm>
     </dsp:sp>
     <dsp:sp modelId="{91D85305-0BEB-4081-937D-AA9856C21F1D}">
@@ -2832,8 +2774,8 @@
       </dsp:nvSpPr>
       <dsp:spPr>
         <a:xfrm>
-          <a:off x="2363648" y="16518"/>
-          <a:ext cx="1211223" cy="1211223"/>
+          <a:off x="2313935" y="2037"/>
+          <a:ext cx="1310649" cy="1310649"/>
         </a:xfrm>
         <a:prstGeom prst="ellipse">
           <a:avLst/>
@@ -2902,12 +2844,12 @@
         </a:fontRef>
       </dsp:style>
       <dsp:txBody>
-        <a:bodyPr spcFirstLastPara="0" vert="horz" wrap="square" lIns="12700" tIns="12700" rIns="12700" bIns="12700" numCol="1" spcCol="1270" anchor="ctr" anchorCtr="0">
+        <a:bodyPr spcFirstLastPara="0" vert="horz" wrap="square" lIns="27940" tIns="27940" rIns="27940" bIns="27940" numCol="1" spcCol="1270" anchor="ctr" anchorCtr="0">
           <a:noAutofit/>
         </a:bodyPr>
         <a:lstStyle/>
         <a:p>
-          <a:pPr marL="0" lvl="0" indent="0" algn="ctr" defTabSz="889000">
+          <a:pPr marL="0" lvl="0" indent="0" algn="ctr" defTabSz="1955800">
             <a:lnSpc>
               <a:spcPct val="90000"/>
             </a:lnSpc>
@@ -2920,14 +2862,14 @@
             <a:buNone/>
           </a:pPr>
           <a:r>
-            <a:rPr lang="en-US" sz="2000" kern="1200" dirty="0"/>
+            <a:rPr lang="en-US" sz="4400" kern="1200" dirty="0"/>
             <a:t>Mill</a:t>
           </a:r>
         </a:p>
       </dsp:txBody>
       <dsp:txXfrm>
-        <a:off x="2541028" y="193898"/>
-        <a:ext cx="856463" cy="856463"/>
+        <a:off x="2505875" y="193977"/>
+        <a:ext cx="926769" cy="926769"/>
       </dsp:txXfrm>
     </dsp:sp>
     <dsp:sp modelId="{C9649257-D584-4E7E-98C2-9DD68751853B}">
@@ -2936,9 +2878,9 @@
         <dsp:cNvSpPr/>
       </dsp:nvSpPr>
       <dsp:spPr>
-        <a:xfrm rot="19748999">
-          <a:off x="3462363" y="1799813"/>
-          <a:ext cx="379130" cy="36712"/>
+        <a:xfrm rot="20463808">
+          <a:off x="3578219" y="2092979"/>
+          <a:ext cx="402725" cy="39726"/>
         </a:xfrm>
         <a:custGeom>
           <a:avLst/>
@@ -2949,10 +2891,10 @@
           <a:pathLst>
             <a:path>
               <a:moveTo>
-                <a:pt x="0" y="18356"/>
+                <a:pt x="0" y="19863"/>
               </a:moveTo>
               <a:lnTo>
-                <a:pt x="379130" y="18356"/>
+                <a:pt x="402725" y="19863"/>
               </a:lnTo>
             </a:path>
           </a:pathLst>
@@ -3007,8 +2949,8 @@
         </a:p>
       </dsp:txBody>
       <dsp:txXfrm>
-        <a:off x="3642451" y="1808691"/>
-        <a:ext cx="18956" cy="18956"/>
+        <a:off x="3769514" y="2102774"/>
+        <a:ext cx="20136" cy="20136"/>
       </dsp:txXfrm>
     </dsp:sp>
     <dsp:sp modelId="{1969FD29-2861-483F-B98F-A06887FAA1AB}">
@@ -3018,8 +2960,8 @@
       </dsp:nvSpPr>
       <dsp:spPr>
         <a:xfrm>
-          <a:off x="3728987" y="804797"/>
-          <a:ext cx="1211223" cy="1211223"/>
+          <a:off x="3934580" y="1179504"/>
+          <a:ext cx="1310649" cy="1310649"/>
         </a:xfrm>
         <a:prstGeom prst="ellipse">
           <a:avLst/>
@@ -3088,12 +3030,12 @@
         </a:fontRef>
       </dsp:style>
       <dsp:txBody>
-        <a:bodyPr spcFirstLastPara="0" vert="horz" wrap="square" lIns="12700" tIns="12700" rIns="12700" bIns="12700" numCol="1" spcCol="1270" anchor="ctr" anchorCtr="0">
+        <a:bodyPr spcFirstLastPara="0" vert="horz" wrap="square" lIns="27940" tIns="27940" rIns="27940" bIns="27940" numCol="1" spcCol="1270" anchor="ctr" anchorCtr="0">
           <a:noAutofit/>
         </a:bodyPr>
         <a:lstStyle/>
         <a:p>
-          <a:pPr marL="0" lvl="0" indent="0" algn="ctr" defTabSz="889000">
+          <a:pPr marL="0" lvl="0" indent="0" algn="ctr" defTabSz="1955800">
             <a:lnSpc>
               <a:spcPct val="90000"/>
             </a:lnSpc>
@@ -3106,14 +3048,14 @@
             <a:buNone/>
           </a:pPr>
           <a:r>
-            <a:rPr lang="en-US" sz="2000" kern="1200" dirty="0"/>
+            <a:rPr lang="en-US" sz="4400" kern="1200" dirty="0"/>
             <a:t>Mill</a:t>
           </a:r>
         </a:p>
       </dsp:txBody>
       <dsp:txXfrm>
-        <a:off x="3906367" y="982177"/>
-        <a:ext cx="856463" cy="856463"/>
+        <a:off x="4126520" y="1371444"/>
+        <a:ext cx="926769" cy="926769"/>
       </dsp:txXfrm>
     </dsp:sp>
     <dsp:sp modelId="{2652E8EA-740B-4638-861B-94C19CBD20FB}">
@@ -3122,9 +3064,9 @@
         <dsp:cNvSpPr/>
       </dsp:nvSpPr>
       <dsp:spPr>
-        <a:xfrm rot="1748110">
-          <a:off x="3475983" y="2588091"/>
-          <a:ext cx="351890" cy="36712"/>
+        <a:xfrm rot="3204589">
+          <a:off x="3285234" y="3045570"/>
+          <a:ext cx="369664" cy="39726"/>
         </a:xfrm>
         <a:custGeom>
           <a:avLst/>
@@ -3135,10 +3077,10 @@
           <a:pathLst>
             <a:path>
               <a:moveTo>
-                <a:pt x="0" y="18356"/>
+                <a:pt x="0" y="19863"/>
               </a:moveTo>
               <a:lnTo>
-                <a:pt x="351890" y="18356"/>
+                <a:pt x="369664" y="19863"/>
               </a:lnTo>
             </a:path>
           </a:pathLst>
@@ -3193,8 +3135,8 @@
         </a:p>
       </dsp:txBody>
       <dsp:txXfrm>
-        <a:off x="3643132" y="2597650"/>
-        <a:ext cx="17594" cy="17594"/>
+        <a:off x="3460825" y="3056192"/>
+        <a:ext cx="18483" cy="18483"/>
       </dsp:txXfrm>
     </dsp:sp>
     <dsp:sp modelId="{A8809457-BD18-4BD7-845E-9332A0605F7E}">
@@ -3204,8 +3146,8 @@
       </dsp:nvSpPr>
       <dsp:spPr>
         <a:xfrm>
-          <a:off x="3728987" y="2381354"/>
-          <a:ext cx="1211223" cy="1211223"/>
+          <a:off x="3315549" y="3084687"/>
+          <a:ext cx="1310649" cy="1310649"/>
         </a:xfrm>
         <a:prstGeom prst="ellipse">
           <a:avLst/>
@@ -3274,12 +3216,12 @@
         </a:fontRef>
       </dsp:style>
       <dsp:txBody>
-        <a:bodyPr spcFirstLastPara="0" vert="horz" wrap="square" lIns="12700" tIns="12700" rIns="12700" bIns="12700" numCol="1" spcCol="1270" anchor="ctr" anchorCtr="0">
+        <a:bodyPr spcFirstLastPara="0" vert="horz" wrap="square" lIns="27940" tIns="27940" rIns="27940" bIns="27940" numCol="1" spcCol="1270" anchor="ctr" anchorCtr="0">
           <a:noAutofit/>
         </a:bodyPr>
         <a:lstStyle/>
         <a:p>
-          <a:pPr marL="0" lvl="0" indent="0" algn="ctr" defTabSz="889000">
+          <a:pPr marL="0" lvl="0" indent="0" algn="ctr" defTabSz="1955800">
             <a:lnSpc>
               <a:spcPct val="90000"/>
             </a:lnSpc>
@@ -3292,14 +3234,14 @@
             <a:buNone/>
           </a:pPr>
           <a:r>
-            <a:rPr lang="en-US" sz="2000" kern="1200" dirty="0"/>
+            <a:rPr lang="en-US" sz="4400" kern="1200" dirty="0"/>
             <a:t>Mill</a:t>
           </a:r>
         </a:p>
       </dsp:txBody>
       <dsp:txXfrm>
-        <a:off x="3906367" y="2558734"/>
-        <a:ext cx="856463" cy="856463"/>
+        <a:off x="3507489" y="3276627"/>
+        <a:ext cx="926769" cy="926769"/>
       </dsp:txXfrm>
     </dsp:sp>
     <dsp:sp modelId="{03A2BED5-0017-41B0-9066-1C32BE7DD2D4}">
@@ -3308,9 +3250,9 @@
         <dsp:cNvSpPr/>
       </dsp:nvSpPr>
       <dsp:spPr>
-        <a:xfrm rot="5400000">
-          <a:off x="2800214" y="2982231"/>
-          <a:ext cx="338091" cy="36712"/>
+        <a:xfrm rot="7595411">
+          <a:off x="2283620" y="3045570"/>
+          <a:ext cx="369664" cy="39726"/>
         </a:xfrm>
         <a:custGeom>
           <a:avLst/>
@@ -3321,10 +3263,10 @@
           <a:pathLst>
             <a:path>
               <a:moveTo>
-                <a:pt x="0" y="18356"/>
+                <a:pt x="0" y="19863"/>
               </a:moveTo>
               <a:lnTo>
-                <a:pt x="338091" y="18356"/>
+                <a:pt x="369664" y="19863"/>
               </a:lnTo>
             </a:path>
           </a:pathLst>
@@ -3378,9 +3320,9 @@
           <a:endParaRPr lang="en-US" sz="500" kern="1200"/>
         </a:p>
       </dsp:txBody>
-      <dsp:txXfrm>
-        <a:off x="2960807" y="2992135"/>
-        <a:ext cx="16904" cy="16904"/>
+      <dsp:txXfrm rot="10800000">
+        <a:off x="2459211" y="3056192"/>
+        <a:ext cx="18483" cy="18483"/>
       </dsp:txXfrm>
     </dsp:sp>
     <dsp:sp modelId="{5A9F9BA0-9F60-461A-99A7-56018E4F7CA4}">
@@ -3390,8 +3332,8 @@
       </dsp:nvSpPr>
       <dsp:spPr>
         <a:xfrm>
-          <a:off x="2363648" y="3169633"/>
-          <a:ext cx="1211223" cy="1211223"/>
+          <a:off x="1312321" y="3084687"/>
+          <a:ext cx="1310649" cy="1310649"/>
         </a:xfrm>
         <a:prstGeom prst="ellipse">
           <a:avLst/>
@@ -3460,12 +3402,12 @@
         </a:fontRef>
       </dsp:style>
       <dsp:txBody>
-        <a:bodyPr spcFirstLastPara="0" vert="horz" wrap="square" lIns="12700" tIns="12700" rIns="12700" bIns="12700" numCol="1" spcCol="1270" anchor="ctr" anchorCtr="0">
+        <a:bodyPr spcFirstLastPara="0" vert="horz" wrap="square" lIns="27940" tIns="27940" rIns="27940" bIns="27940" numCol="1" spcCol="1270" anchor="ctr" anchorCtr="0">
           <a:noAutofit/>
         </a:bodyPr>
         <a:lstStyle/>
         <a:p>
-          <a:pPr marL="0" lvl="0" indent="0" algn="ctr" defTabSz="889000">
+          <a:pPr marL="0" lvl="0" indent="0" algn="ctr" defTabSz="1955800">
             <a:lnSpc>
               <a:spcPct val="90000"/>
             </a:lnSpc>
@@ -3478,14 +3420,14 @@
             <a:buNone/>
           </a:pPr>
           <a:r>
-            <a:rPr lang="en-US" sz="2000" kern="1200" dirty="0"/>
-            <a:t>Inspect</a:t>
+            <a:rPr lang="en-US" sz="4400" kern="1200" dirty="0"/>
+            <a:t>Mill</a:t>
           </a:r>
         </a:p>
       </dsp:txBody>
       <dsp:txXfrm>
-        <a:off x="2541028" y="3347013"/>
-        <a:ext cx="856463" cy="856463"/>
+        <a:off x="1504261" y="3276627"/>
+        <a:ext cx="926769" cy="926769"/>
       </dsp:txXfrm>
     </dsp:sp>
     <dsp:sp modelId="{BA1C512C-4E07-4BD6-A98C-4464F32E3D7F}">
@@ -3494,9 +3436,9 @@
         <dsp:cNvSpPr/>
       </dsp:nvSpPr>
       <dsp:spPr>
-        <a:xfrm rot="9051890">
-          <a:off x="2110645" y="2588091"/>
-          <a:ext cx="351890" cy="36712"/>
+        <a:xfrm rot="11936192">
+          <a:off x="1957574" y="2092979"/>
+          <a:ext cx="402725" cy="39726"/>
         </a:xfrm>
         <a:custGeom>
           <a:avLst/>
@@ -3507,10 +3449,10 @@
           <a:pathLst>
             <a:path>
               <a:moveTo>
-                <a:pt x="0" y="18356"/>
+                <a:pt x="0" y="19863"/>
               </a:moveTo>
               <a:lnTo>
-                <a:pt x="351890" y="18356"/>
+                <a:pt x="402725" y="19863"/>
               </a:lnTo>
             </a:path>
           </a:pathLst>
@@ -3565,8 +3507,8 @@
         </a:p>
       </dsp:txBody>
       <dsp:txXfrm rot="10800000">
-        <a:off x="2277793" y="2597650"/>
-        <a:ext cx="17594" cy="17594"/>
+        <a:off x="2148869" y="2102774"/>
+        <a:ext cx="20136" cy="20136"/>
       </dsp:txXfrm>
     </dsp:sp>
     <dsp:sp modelId="{0F5229CA-9F41-4048-BBE1-43E7C3E0A101}">
@@ -3576,8 +3518,8 @@
       </dsp:nvSpPr>
       <dsp:spPr>
         <a:xfrm>
-          <a:off x="998309" y="2381354"/>
-          <a:ext cx="1211223" cy="1211223"/>
+          <a:off x="693289" y="1179504"/>
+          <a:ext cx="1310649" cy="1310649"/>
         </a:xfrm>
         <a:prstGeom prst="ellipse">
           <a:avLst/>
@@ -3646,12 +3588,12 @@
         </a:fontRef>
       </dsp:style>
       <dsp:txBody>
-        <a:bodyPr spcFirstLastPara="0" vert="horz" wrap="square" lIns="12700" tIns="12700" rIns="12700" bIns="12700" numCol="1" spcCol="1270" anchor="ctr" anchorCtr="0">
+        <a:bodyPr spcFirstLastPara="0" vert="horz" wrap="square" lIns="27940" tIns="27940" rIns="27940" bIns="27940" numCol="1" spcCol="1270" anchor="ctr" anchorCtr="0">
           <a:noAutofit/>
         </a:bodyPr>
         <a:lstStyle/>
         <a:p>
-          <a:pPr marL="0" lvl="0" indent="0" algn="ctr" defTabSz="889000">
+          <a:pPr marL="0" lvl="0" indent="0" algn="ctr" defTabSz="1955800">
             <a:lnSpc>
               <a:spcPct val="90000"/>
             </a:lnSpc>
@@ -3664,200 +3606,14 @@
             <a:buNone/>
           </a:pPr>
           <a:r>
-            <a:rPr lang="en-US" sz="2000" kern="1200" dirty="0"/>
-            <a:t>Inspect</a:t>
+            <a:rPr lang="en-US" sz="4400" kern="1200" dirty="0"/>
+            <a:t>Mill</a:t>
           </a:r>
         </a:p>
       </dsp:txBody>
       <dsp:txXfrm>
-        <a:off x="1175689" y="2558734"/>
-        <a:ext cx="856463" cy="856463"/>
-      </dsp:txXfrm>
-    </dsp:sp>
-    <dsp:sp modelId="{F3ED839C-4984-4D6D-86CB-7F036EDBD460}">
-      <dsp:nvSpPr>
-        <dsp:cNvPr id="0" name=""/>
-        <dsp:cNvSpPr/>
-      </dsp:nvSpPr>
-      <dsp:spPr>
-        <a:xfrm rot="12651001">
-          <a:off x="2097025" y="1799813"/>
-          <a:ext cx="379130" cy="36712"/>
-        </a:xfrm>
-        <a:custGeom>
-          <a:avLst/>
-          <a:gdLst/>
-          <a:ahLst/>
-          <a:cxnLst/>
-          <a:rect l="0" t="0" r="0" b="0"/>
-          <a:pathLst>
-            <a:path>
-              <a:moveTo>
-                <a:pt x="0" y="18356"/>
-              </a:moveTo>
-              <a:lnTo>
-                <a:pt x="379130" y="18356"/>
-              </a:lnTo>
-            </a:path>
-          </a:pathLst>
-        </a:custGeom>
-        <a:noFill/>
-        <a:ln w="19050" cap="flat" cmpd="sng" algn="ctr">
-          <a:solidFill>
-            <a:schemeClr val="accent1">
-              <a:shade val="60000"/>
-              <a:hueOff val="0"/>
-              <a:satOff val="0"/>
-              <a:lumOff val="0"/>
-              <a:alphaOff val="0"/>
-            </a:schemeClr>
-          </a:solidFill>
-          <a:prstDash val="solid"/>
-          <a:miter lim="800000"/>
-        </a:ln>
-        <a:effectLst/>
-      </dsp:spPr>
-      <dsp:style>
-        <a:lnRef idx="2">
-          <a:scrgbClr r="0" g="0" b="0"/>
-        </a:lnRef>
-        <a:fillRef idx="0">
-          <a:scrgbClr r="0" g="0" b="0"/>
-        </a:fillRef>
-        <a:effectRef idx="0">
-          <a:scrgbClr r="0" g="0" b="0"/>
-        </a:effectRef>
-        <a:fontRef idx="minor"/>
-      </dsp:style>
-      <dsp:txBody>
-        <a:bodyPr spcFirstLastPara="0" vert="horz" wrap="square" lIns="12700" tIns="0" rIns="12700" bIns="0" numCol="1" spcCol="1270" anchor="ctr" anchorCtr="0">
-          <a:noAutofit/>
-        </a:bodyPr>
-        <a:lstStyle/>
-        <a:p>
-          <a:pPr marL="0" lvl="0" indent="0" algn="ctr" defTabSz="222250">
-            <a:lnSpc>
-              <a:spcPct val="90000"/>
-            </a:lnSpc>
-            <a:spcBef>
-              <a:spcPct val="0"/>
-            </a:spcBef>
-            <a:spcAft>
-              <a:spcPct val="35000"/>
-            </a:spcAft>
-            <a:buNone/>
-          </a:pPr>
-          <a:endParaRPr lang="en-US" sz="500" kern="1200"/>
-        </a:p>
-      </dsp:txBody>
-      <dsp:txXfrm rot="10800000">
-        <a:off x="2277112" y="1808691"/>
-        <a:ext cx="18956" cy="18956"/>
-      </dsp:txXfrm>
-    </dsp:sp>
-    <dsp:sp modelId="{E4ADA844-DB69-474D-B21C-A2FE5BB49D84}">
-      <dsp:nvSpPr>
-        <dsp:cNvPr id="0" name=""/>
-        <dsp:cNvSpPr/>
-      </dsp:nvSpPr>
-      <dsp:spPr>
-        <a:xfrm>
-          <a:off x="998309" y="804797"/>
-          <a:ext cx="1211223" cy="1211223"/>
-        </a:xfrm>
-        <a:prstGeom prst="ellipse">
-          <a:avLst/>
-        </a:prstGeom>
-        <a:gradFill rotWithShape="0">
-          <a:gsLst>
-            <a:gs pos="0">
-              <a:schemeClr val="accent1">
-                <a:hueOff val="0"/>
-                <a:satOff val="0"/>
-                <a:lumOff val="0"/>
-                <a:alphaOff val="0"/>
-                <a:satMod val="103000"/>
-                <a:lumMod val="102000"/>
-                <a:tint val="94000"/>
-              </a:schemeClr>
-            </a:gs>
-            <a:gs pos="50000">
-              <a:schemeClr val="accent1">
-                <a:hueOff val="0"/>
-                <a:satOff val="0"/>
-                <a:lumOff val="0"/>
-                <a:alphaOff val="0"/>
-                <a:satMod val="110000"/>
-                <a:lumMod val="100000"/>
-                <a:shade val="100000"/>
-              </a:schemeClr>
-            </a:gs>
-            <a:gs pos="100000">
-              <a:schemeClr val="accent1">
-                <a:hueOff val="0"/>
-                <a:satOff val="0"/>
-                <a:lumOff val="0"/>
-                <a:alphaOff val="0"/>
-                <a:lumMod val="99000"/>
-                <a:satMod val="120000"/>
-                <a:shade val="78000"/>
-              </a:schemeClr>
-            </a:gs>
-          </a:gsLst>
-          <a:lin ang="5400000" scaled="0"/>
-        </a:gradFill>
-        <a:ln>
-          <a:noFill/>
-        </a:ln>
-        <a:effectLst>
-          <a:outerShdw blurRad="57150" dist="19050" dir="5400000" algn="ctr" rotWithShape="0">
-            <a:srgbClr val="000000">
-              <a:alpha val="63000"/>
-            </a:srgbClr>
-          </a:outerShdw>
-        </a:effectLst>
-      </dsp:spPr>
-      <dsp:style>
-        <a:lnRef idx="0">
-          <a:scrgbClr r="0" g="0" b="0"/>
-        </a:lnRef>
-        <a:fillRef idx="3">
-          <a:scrgbClr r="0" g="0" b="0"/>
-        </a:fillRef>
-        <a:effectRef idx="3">
-          <a:scrgbClr r="0" g="0" b="0"/>
-        </a:effectRef>
-        <a:fontRef idx="minor">
-          <a:schemeClr val="lt1"/>
-        </a:fontRef>
-      </dsp:style>
-      <dsp:txBody>
-        <a:bodyPr spcFirstLastPara="0" vert="horz" wrap="square" lIns="12700" tIns="12700" rIns="12700" bIns="12700" numCol="1" spcCol="1270" anchor="ctr" anchorCtr="0">
-          <a:noAutofit/>
-        </a:bodyPr>
-        <a:lstStyle/>
-        <a:p>
-          <a:pPr marL="0" lvl="0" indent="0" algn="ctr" defTabSz="889000">
-            <a:lnSpc>
-              <a:spcPct val="90000"/>
-            </a:lnSpc>
-            <a:spcBef>
-              <a:spcPct val="0"/>
-            </a:spcBef>
-            <a:spcAft>
-              <a:spcPct val="35000"/>
-            </a:spcAft>
-            <a:buNone/>
-          </a:pPr>
-          <a:r>
-            <a:rPr lang="en-US" sz="2000" kern="1200" dirty="0"/>
-            <a:t>Inspect</a:t>
-          </a:r>
-        </a:p>
-      </dsp:txBody>
-      <dsp:txXfrm>
-        <a:off x="1175689" y="982177"/>
-        <a:ext cx="856463" cy="856463"/>
+        <a:off x="885229" y="1371444"/>
+        <a:ext cx="926769" cy="926769"/>
       </dsp:txXfrm>
     </dsp:sp>
   </dsp:spTree>
@@ -3865,12 +3621,11 @@
 </file>
 
 <file path=ppt/diagrams/layout1.xml><?xml version="1.0" encoding="utf-8"?>
-<dgm:layoutDef xmlns:dgm="http://schemas.openxmlformats.org/drawingml/2006/diagram" xmlns:a="http://schemas.openxmlformats.org/drawingml/2006/main" uniqueId="urn:microsoft.com/office/officeart/2005/8/layout/process1">
+<dgm:layoutDef xmlns:dgm="http://schemas.openxmlformats.org/drawingml/2006/diagram" xmlns:a="http://schemas.openxmlformats.org/drawingml/2006/main" uniqueId="urn:microsoft.com/office/officeart/2005/8/layout/process2">
   <dgm:title val=""/>
   <dgm:desc val=""/>
   <dgm:catLst>
-    <dgm:cat type="process" pri="1000"/>
-    <dgm:cat type="convert" pri="15000"/>
+    <dgm:cat type="process" pri="13000"/>
   </dgm:catLst>
   <dgm:sampData useDef="1">
     <dgm:dataModel>
@@ -3913,31 +3668,22 @@
       <dgm:whole/>
     </dgm:dataModel>
   </dgm:clrData>
-  <dgm:layoutNode name="Name0">
+  <dgm:layoutNode name="linearFlow">
     <dgm:varLst>
-      <dgm:dir/>
       <dgm:resizeHandles val="exact"/>
     </dgm:varLst>
-    <dgm:choose name="Name1">
-      <dgm:if name="Name2" func="var" arg="dir" op="equ" val="norm">
-        <dgm:alg type="lin"/>
-      </dgm:if>
-      <dgm:else name="Name3">
-        <dgm:alg type="lin">
-          <dgm:param type="linDir" val="fromR"/>
-        </dgm:alg>
-      </dgm:else>
-    </dgm:choose>
+    <dgm:alg type="lin">
+      <dgm:param type="linDir" val="fromT"/>
+    </dgm:alg>
     <dgm:shape xmlns:r="http://schemas.openxmlformats.org/officeDocument/2006/relationships" r:blip="">
       <dgm:adjLst/>
     </dgm:shape>
     <dgm:presOf/>
     <dgm:constrLst>
-      <dgm:constr type="w" for="ch" ptType="node" refType="w"/>
-      <dgm:constr type="h" for="ch" ptType="node" op="equ"/>
+      <dgm:constr type="h" for="ch" ptType="node" refType="h"/>
+      <dgm:constr type="h" for="ch" ptType="sibTrans" refType="h" refFor="ch" refPtType="node" fact="0.5"/>
+      <dgm:constr type="w" for="ch" ptType="node" op="equ"/>
       <dgm:constr type="primFontSz" for="ch" ptType="node" op="equ" val="65"/>
-      <dgm:constr type="w" for="ch" ptType="sibTrans" refType="w" refFor="ch" refPtType="node" op="equ" fact="0.4"/>
-      <dgm:constr type="h" for="ch" ptType="sibTrans" op="equ"/>
       <dgm:constr type="primFontSz" for="des" forName="connectorText" op="equ" val="55"/>
       <dgm:constr type="primFontSz" for="des" forName="connectorText" refType="primFontSz" refFor="ch" refPtType="node" op="lte" fact="0.8"/>
     </dgm:constrLst>
@@ -3947,7 +3693,18 @@
         <dgm:varLst>
           <dgm:bulletEnabled val="1"/>
         </dgm:varLst>
-        <dgm:alg type="tx"/>
+        <dgm:choose name="Name0">
+          <dgm:if name="Name1" axis="root des" ptType="all node" func="maxDepth" op="gt" val="1">
+            <dgm:alg type="tx">
+              <dgm:param type="parTxLTRAlign" val="l"/>
+              <dgm:param type="parTxRTLAlign" val="r"/>
+              <dgm:param type="txAnchorVertCh" val="mid"/>
+            </dgm:alg>
+          </dgm:if>
+          <dgm:else name="Name2">
+            <dgm:alg type="tx"/>
+          </dgm:else>
+        </dgm:choose>
         <dgm:shape xmlns:r="http://schemas.openxmlformats.org/officeDocument/2006/relationships" type="roundRect" r:blip="">
           <dgm:adjLst>
             <dgm:adj idx="1" val="0.1"/>
@@ -3955,7 +3712,7 @@
         </dgm:shape>
         <dgm:presOf axis="desOrSelf" ptType="node"/>
         <dgm:constrLst>
-          <dgm:constr type="h" refType="w" fact="0.6"/>
+          <dgm:constr type="w" refType="h" fact="1.8"/>
           <dgm:constr type="tMarg" refType="primFontSz" fact="0.3"/>
           <dgm:constr type="bMarg" refType="primFontSz" fact="0.3"/>
           <dgm:constr type="lMarg" refType="primFontSz" fact="0.3"/>
@@ -3963,9 +3720,8 @@
         </dgm:constrLst>
         <dgm:ruleLst>
           <dgm:rule type="primFontSz" val="18" fact="NaN" max="NaN"/>
-          <dgm:rule type="h" val="NaN" fact="1.5" max="NaN"/>
+          <dgm:rule type="w" val="NaN" fact="4" max="NaN"/>
           <dgm:rule type="primFontSz" val="5" fact="NaN" max="NaN"/>
-          <dgm:rule type="h" val="INF" fact="NaN" max="NaN"/>
         </dgm:ruleLst>
       </dgm:layoutNode>
       <dgm:forEach name="sibTransForEach" axis="followSib" ptType="sibTrans" cnt="1">
@@ -3979,15 +3735,18 @@
           </dgm:shape>
           <dgm:presOf axis="self"/>
           <dgm:constrLst>
-            <dgm:constr type="h" refType="w" fact="0.62"/>
+            <dgm:constr type="w" refType="h" fact="0.9"/>
             <dgm:constr type="connDist"/>
-            <dgm:constr type="begPad" refType="connDist" fact="0.25"/>
-            <dgm:constr type="endPad" refType="connDist" fact="0.22"/>
+            <dgm:constr type="wArH" refType="w" fact="0.5"/>
+            <dgm:constr type="hArH" refType="w"/>
+            <dgm:constr type="stemThick" refType="w" fact="0.6"/>
+            <dgm:constr type="begPad" refType="connDist" fact="0.125"/>
+            <dgm:constr type="endPad" refType="connDist" fact="0.125"/>
           </dgm:constrLst>
           <dgm:ruleLst/>
           <dgm:layoutNode name="connectorText">
             <dgm:alg type="tx">
-              <dgm:param type="autoTxRot" val="grav"/>
+              <dgm:param type="autoTxRot" val="upr"/>
             </dgm:alg>
             <dgm:shape xmlns:r="http://schemas.openxmlformats.org/officeDocument/2006/relationships" type="conn" r:blip="" hideGeom="1">
               <dgm:adjLst/>
@@ -6453,7 +6212,7 @@
           <a:p>
             <a:fld id="{A38B5642-1FE8-45AC-B383-08189DAF0CB7}" type="datetimeFigureOut">
               <a:rPr lang="en-US" smtClean="0"/>
-              <a:t>5/16/2024</a:t>
+              <a:t>5/17/2024</a:t>
             </a:fld>
             <a:endParaRPr lang="en-US"/>
           </a:p>
@@ -6651,7 +6410,7 @@
           <a:p>
             <a:fld id="{A38B5642-1FE8-45AC-B383-08189DAF0CB7}" type="datetimeFigureOut">
               <a:rPr lang="en-US" smtClean="0"/>
-              <a:t>5/16/2024</a:t>
+              <a:t>5/17/2024</a:t>
             </a:fld>
             <a:endParaRPr lang="en-US"/>
           </a:p>
@@ -6859,7 +6618,7 @@
           <a:p>
             <a:fld id="{A38B5642-1FE8-45AC-B383-08189DAF0CB7}" type="datetimeFigureOut">
               <a:rPr lang="en-US" smtClean="0"/>
-              <a:t>5/16/2024</a:t>
+              <a:t>5/17/2024</a:t>
             </a:fld>
             <a:endParaRPr lang="en-US"/>
           </a:p>
@@ -7057,7 +6816,7 @@
           <a:p>
             <a:fld id="{A38B5642-1FE8-45AC-B383-08189DAF0CB7}" type="datetimeFigureOut">
               <a:rPr lang="en-US" smtClean="0"/>
-              <a:t>5/16/2024</a:t>
+              <a:t>5/17/2024</a:t>
             </a:fld>
             <a:endParaRPr lang="en-US"/>
           </a:p>
@@ -7332,7 +7091,7 @@
           <a:p>
             <a:fld id="{A38B5642-1FE8-45AC-B383-08189DAF0CB7}" type="datetimeFigureOut">
               <a:rPr lang="en-US" smtClean="0"/>
-              <a:t>5/16/2024</a:t>
+              <a:t>5/17/2024</a:t>
             </a:fld>
             <a:endParaRPr lang="en-US"/>
           </a:p>
@@ -7597,7 +7356,7 @@
           <a:p>
             <a:fld id="{A38B5642-1FE8-45AC-B383-08189DAF0CB7}" type="datetimeFigureOut">
               <a:rPr lang="en-US" smtClean="0"/>
-              <a:t>5/16/2024</a:t>
+              <a:t>5/17/2024</a:t>
             </a:fld>
             <a:endParaRPr lang="en-US"/>
           </a:p>
@@ -8009,7 +7768,7 @@
           <a:p>
             <a:fld id="{A38B5642-1FE8-45AC-B383-08189DAF0CB7}" type="datetimeFigureOut">
               <a:rPr lang="en-US" smtClean="0"/>
-              <a:t>5/16/2024</a:t>
+              <a:t>5/17/2024</a:t>
             </a:fld>
             <a:endParaRPr lang="en-US"/>
           </a:p>
@@ -8150,7 +7909,7 @@
           <a:p>
             <a:fld id="{A38B5642-1FE8-45AC-B383-08189DAF0CB7}" type="datetimeFigureOut">
               <a:rPr lang="en-US" smtClean="0"/>
-              <a:t>5/16/2024</a:t>
+              <a:t>5/17/2024</a:t>
             </a:fld>
             <a:endParaRPr lang="en-US"/>
           </a:p>
@@ -8263,7 +8022,7 @@
           <a:p>
             <a:fld id="{A38B5642-1FE8-45AC-B383-08189DAF0CB7}" type="datetimeFigureOut">
               <a:rPr lang="en-US" smtClean="0"/>
-              <a:t>5/16/2024</a:t>
+              <a:t>5/17/2024</a:t>
             </a:fld>
             <a:endParaRPr lang="en-US"/>
           </a:p>
@@ -8574,7 +8333,7 @@
           <a:p>
             <a:fld id="{A38B5642-1FE8-45AC-B383-08189DAF0CB7}" type="datetimeFigureOut">
               <a:rPr lang="en-US" smtClean="0"/>
-              <a:t>5/16/2024</a:t>
+              <a:t>5/17/2024</a:t>
             </a:fld>
             <a:endParaRPr lang="en-US"/>
           </a:p>
@@ -8862,7 +8621,7 @@
           <a:p>
             <a:fld id="{A38B5642-1FE8-45AC-B383-08189DAF0CB7}" type="datetimeFigureOut">
               <a:rPr lang="en-US" smtClean="0"/>
-              <a:t>5/16/2024</a:t>
+              <a:t>5/17/2024</a:t>
             </a:fld>
             <a:endParaRPr lang="en-US"/>
           </a:p>
@@ -9103,7 +8862,7 @@
           <a:p>
             <a:fld id="{A38B5642-1FE8-45AC-B383-08189DAF0CB7}" type="datetimeFigureOut">
               <a:rPr lang="en-US" smtClean="0"/>
-              <a:t>5/16/2024</a:t>
+              <a:t>5/17/2024</a:t>
             </a:fld>
             <a:endParaRPr lang="en-US"/>
           </a:p>
@@ -9634,119 +9393,6 @@
           </a:p>
         </p:txBody>
       </p:sp>
-      <p:graphicFrame>
-        <p:nvGraphicFramePr>
-          <p:cNvPr id="5" name="Diagram 4">
-            <a:extLst>
-              <a:ext uri="{FF2B5EF4-FFF2-40B4-BE49-F238E27FC236}">
-                <a16:creationId xmlns:a16="http://schemas.microsoft.com/office/drawing/2014/main" id="{A04EA37B-8DE0-BA51-70E7-3BCC6521B8D4}"/>
-              </a:ext>
-            </a:extLst>
-          </p:cNvPr>
-          <p:cNvGraphicFramePr/>
-          <p:nvPr>
-            <p:extLst>
-              <p:ext uri="{D42A27DB-BD31-4B8C-83A1-F6EECF244321}">
-                <p14:modId xmlns:p14="http://schemas.microsoft.com/office/powerpoint/2010/main" val="620424143"/>
-              </p:ext>
-            </p:extLst>
-          </p:nvPr>
-        </p:nvGraphicFramePr>
-        <p:xfrm>
-          <a:off x="838200" y="1869441"/>
-          <a:ext cx="4699000" cy="2524759"/>
-        </p:xfrm>
-        <a:graphic>
-          <a:graphicData uri="http://schemas.openxmlformats.org/drawingml/2006/diagram">
-            <dgm:relIds xmlns:dgm="http://schemas.openxmlformats.org/drawingml/2006/diagram" xmlns:r="http://schemas.openxmlformats.org/officeDocument/2006/relationships" r:dm="rId2" r:lo="rId3" r:qs="rId4" r:cs="rId5"/>
-          </a:graphicData>
-        </a:graphic>
-      </p:graphicFrame>
-      <p:sp>
-        <p:nvSpPr>
-          <p:cNvPr id="10" name="Arrow: Circular 9">
-            <a:extLst>
-              <a:ext uri="{FF2B5EF4-FFF2-40B4-BE49-F238E27FC236}">
-                <a16:creationId xmlns:a16="http://schemas.microsoft.com/office/drawing/2014/main" id="{2CC6CE97-1A62-00AD-1956-849C0C459771}"/>
-              </a:ext>
-            </a:extLst>
-          </p:cNvPr>
-          <p:cNvSpPr/>
-          <p:nvPr/>
-        </p:nvSpPr>
-        <p:spPr>
-          <a:xfrm rot="10800000">
-            <a:off x="2877820" y="2334260"/>
-            <a:ext cx="2428240" cy="2362200"/>
-          </a:xfrm>
-          <a:prstGeom prst="circularArrow">
-            <a:avLst/>
-          </a:prstGeom>
-        </p:spPr>
-        <p:style>
-          <a:lnRef idx="2">
-            <a:schemeClr val="accent1">
-              <a:shade val="15000"/>
-            </a:schemeClr>
-          </a:lnRef>
-          <a:fillRef idx="1">
-            <a:schemeClr val="accent1"/>
-          </a:fillRef>
-          <a:effectRef idx="0">
-            <a:schemeClr val="accent1"/>
-          </a:effectRef>
-          <a:fontRef idx="minor">
-            <a:schemeClr val="lt1"/>
-          </a:fontRef>
-        </p:style>
-        <p:txBody>
-          <a:bodyPr rtlCol="0" anchor="ctr"/>
-          <a:lstStyle/>
-          <a:p>
-            <a:pPr algn="ctr"/>
-            <a:endParaRPr lang="en-US">
-              <a:solidFill>
-                <a:schemeClr val="tx1"/>
-              </a:solidFill>
-            </a:endParaRPr>
-          </a:p>
-        </p:txBody>
-      </p:sp>
-      <p:sp>
-        <p:nvSpPr>
-          <p:cNvPr id="11" name="TextBox 10">
-            <a:extLst>
-              <a:ext uri="{FF2B5EF4-FFF2-40B4-BE49-F238E27FC236}">
-                <a16:creationId xmlns:a16="http://schemas.microsoft.com/office/drawing/2014/main" id="{8E1D5402-5EB4-626E-FC68-DC72BA81F536}"/>
-              </a:ext>
-            </a:extLst>
-          </p:cNvPr>
-          <p:cNvSpPr txBox="1"/>
-          <p:nvPr/>
-        </p:nvSpPr>
-        <p:spPr>
-          <a:xfrm>
-            <a:off x="3547110" y="4674353"/>
-            <a:ext cx="1249680" cy="369332"/>
-          </a:xfrm>
-          <a:prstGeom prst="rect">
-            <a:avLst/>
-          </a:prstGeom>
-          <a:noFill/>
-        </p:spPr>
-        <p:txBody>
-          <a:bodyPr wrap="square" rtlCol="0">
-            <a:spAutoFit/>
-          </a:bodyPr>
-          <a:lstStyle/>
-          <a:p>
-            <a:r>
-              <a:rPr lang="en-US" dirty="0"/>
-              <a:t>Remake</a:t>
-            </a:r>
-          </a:p>
-        </p:txBody>
-      </p:sp>
       <p:sp>
         <p:nvSpPr>
           <p:cNvPr id="7" name="TextBox 6">
@@ -9762,7 +9408,7 @@
         <p:spPr>
           <a:xfrm>
             <a:off x="5908040" y="1690688"/>
-            <a:ext cx="5659120" cy="4801314"/>
+            <a:ext cx="5659120" cy="3970318"/>
           </a:xfrm>
           <a:prstGeom prst="rect">
             <a:avLst/>
@@ -9801,7 +9447,7 @@
             </a:pPr>
             <a:r>
               <a:rPr lang="en-US" dirty="0"/>
-              <a:t>Inspect if the part was as per dentist’s prescription</a:t>
+              <a:t>Mill in the diagram is machine which takes a block of material and creates the required shape</a:t>
             </a:r>
           </a:p>
           <a:p>
@@ -9811,7 +9457,7 @@
             </a:pPr>
             <a:r>
               <a:rPr lang="en-US" dirty="0"/>
-              <a:t>Mill in the diagram is machine which takes a block of material and removes material to get the required shape</a:t>
+              <a:t>Mill is connected and controlled by application running on a computer connected to it</a:t>
             </a:r>
           </a:p>
           <a:p>
@@ -9821,41 +9467,79 @@
             </a:pPr>
             <a:r>
               <a:rPr lang="en-US" dirty="0"/>
-              <a:t>Mill is connected and controlled by application running on a computer connected to it</a:t>
-            </a:r>
-          </a:p>
-          <a:p>
-            <a:pPr marL="285750" indent="-285750">
+              <a:t>Milling stations are IoT enabled and track machine status updates and job status updates . Examples below</a:t>
+            </a:r>
+          </a:p>
+          <a:p>
+            <a:pPr marL="742950" lvl="1" indent="-285750">
               <a:buFont typeface="Arial" panose="020B0604020202020204" pitchFamily="34" charset="0"/>
               <a:buChar char="•"/>
             </a:pPr>
             <a:r>
               <a:rPr lang="en-US" dirty="0"/>
-              <a:t>Inspect in the diagram is inspection software component </a:t>
-            </a:r>
-          </a:p>
-          <a:p>
-            <a:pPr marL="285750" indent="-285750">
+              <a:t>Cancel Job based on dentist’s request</a:t>
+            </a:r>
+          </a:p>
+          <a:p>
+            <a:pPr marL="742950" lvl="1" indent="-285750">
               <a:buFont typeface="Arial" panose="020B0604020202020204" pitchFamily="34" charset="0"/>
               <a:buChar char="•"/>
             </a:pPr>
             <a:r>
               <a:rPr lang="en-US" dirty="0"/>
-              <a:t>Inspect component is connected to vision / imaging system / Face Id to track operator plus it can have functionalities where user can accept or reject a part </a:t>
-            </a:r>
-          </a:p>
-          <a:p>
-            <a:pPr marL="285750" indent="-285750">
+              <a:t>Transfer Job from one mill to another mill</a:t>
+            </a:r>
+          </a:p>
+          <a:p>
+            <a:pPr marL="742950" lvl="1" indent="-285750">
               <a:buFont typeface="Arial" panose="020B0604020202020204" pitchFamily="34" charset="0"/>
               <a:buChar char="•"/>
             </a:pPr>
             <a:r>
               <a:rPr lang="en-US" dirty="0"/>
-              <a:t>Both milling and Inspect station are IoT enabled which helps in tracking OEE (Overall Equipment availability ) </a:t>
+              <a:t>Mill state changes from making to calibration</a:t>
+            </a:r>
+          </a:p>
+          <a:p>
+            <a:pPr marL="742950" lvl="1" indent="-285750">
+              <a:buFont typeface="Arial" panose="020B0604020202020204" pitchFamily="34" charset="0"/>
+              <a:buChar char="•"/>
+            </a:pPr>
+            <a:r>
+              <a:rPr lang="en-US" dirty="0"/>
+              <a:t>Monitor voltage supply , temperature of mill</a:t>
             </a:r>
           </a:p>
         </p:txBody>
       </p:sp>
+      <p:graphicFrame>
+        <p:nvGraphicFramePr>
+          <p:cNvPr id="4" name="Diagram 3">
+            <a:extLst>
+              <a:ext uri="{FF2B5EF4-FFF2-40B4-BE49-F238E27FC236}">
+                <a16:creationId xmlns:a16="http://schemas.microsoft.com/office/drawing/2014/main" id="{9F491DA9-566F-EF11-128B-2A2FFAF99EB4}"/>
+              </a:ext>
+            </a:extLst>
+          </p:cNvPr>
+          <p:cNvGraphicFramePr/>
+          <p:nvPr>
+            <p:extLst>
+              <p:ext uri="{D42A27DB-BD31-4B8C-83A1-F6EECF244321}">
+                <p14:modId xmlns:p14="http://schemas.microsoft.com/office/powerpoint/2010/main" val="3710977413"/>
+              </p:ext>
+            </p:extLst>
+          </p:nvPr>
+        </p:nvGraphicFramePr>
+        <p:xfrm>
+          <a:off x="106680" y="1690688"/>
+          <a:ext cx="5262880" cy="4430712"/>
+        </p:xfrm>
+        <a:graphic>
+          <a:graphicData uri="http://schemas.openxmlformats.org/drawingml/2006/diagram">
+            <dgm:relIds xmlns:dgm="http://schemas.openxmlformats.org/drawingml/2006/diagram" xmlns:r="http://schemas.openxmlformats.org/officeDocument/2006/relationships" r:dm="rId2" r:lo="rId3" r:qs="rId4" r:cs="rId5"/>
+          </a:graphicData>
+        </a:graphic>
+      </p:graphicFrame>
     </p:spTree>
     <p:extLst>
       <p:ext uri="{BB962C8B-B14F-4D97-AF65-F5344CB8AC3E}">
@@ -9933,11 +9617,6 @@
           </p:cNvGraphicFramePr>
           <p:nvPr>
             <p:ph idx="1"/>
-            <p:extLst>
-              <p:ext uri="{D42A27DB-BD31-4B8C-83A1-F6EECF244321}">
-                <p14:modId xmlns:p14="http://schemas.microsoft.com/office/powerpoint/2010/main" val="791013150"/>
-              </p:ext>
-            </p:extLst>
           </p:nvPr>
         </p:nvGraphicFramePr>
         <p:xfrm>
@@ -9965,7 +9644,7 @@
         <p:spPr>
           <a:xfrm>
             <a:off x="5933440" y="1588094"/>
-            <a:ext cx="5659120" cy="4801314"/>
+            <a:ext cx="5659120" cy="5078313"/>
           </a:xfrm>
           <a:prstGeom prst="rect">
             <a:avLst/>
@@ -9984,7 +9663,7 @@
             </a:pPr>
             <a:r>
               <a:rPr lang="en-US" dirty="0"/>
-              <a:t>There can be multiple instances of mill and Inspection stations based on throughput requirements</a:t>
+              <a:t>There can be multiple instances of mills based on throughput requirements</a:t>
             </a:r>
           </a:p>
           <a:p>
@@ -9994,7 +9673,7 @@
             </a:pPr>
             <a:r>
               <a:rPr lang="en-US" dirty="0"/>
-              <a:t>There is a IoT component which controls the working of the stations</a:t>
+              <a:t>There is a main component which controls the working of the stations</a:t>
             </a:r>
           </a:p>
           <a:p>
@@ -10004,7 +9683,7 @@
             </a:pPr>
             <a:r>
               <a:rPr lang="en-US" dirty="0"/>
-              <a:t>Start Station</a:t>
+              <a:t>Start Mill</a:t>
             </a:r>
           </a:p>
           <a:p>
@@ -10014,7 +9693,7 @@
             </a:pPr>
             <a:r>
               <a:rPr lang="en-US" dirty="0"/>
-              <a:t>Stop Station</a:t>
+              <a:t>Stop Mill</a:t>
             </a:r>
           </a:p>
           <a:p>
@@ -10034,7 +9713,7 @@
             </a:pPr>
             <a:r>
               <a:rPr lang="en-US" dirty="0"/>
-              <a:t>Redo Job</a:t>
+              <a:t>Transfer Job</a:t>
             </a:r>
           </a:p>
           <a:p>
@@ -10044,7 +9723,7 @@
             </a:pPr>
             <a:r>
               <a:rPr lang="en-US" dirty="0"/>
-              <a:t>Calibration</a:t>
+              <a:t>Switch To Calibration</a:t>
             </a:r>
           </a:p>
           <a:p>
@@ -10054,7 +9733,7 @@
             </a:pPr>
             <a:r>
               <a:rPr lang="en-US" dirty="0"/>
-              <a:t>Tool changes</a:t>
+              <a:t>Receive Temperature as continues stream</a:t>
             </a:r>
           </a:p>
           <a:p>
@@ -10064,17 +9743,7 @@
             </a:pPr>
             <a:r>
               <a:rPr lang="en-US" dirty="0"/>
-              <a:t>Send Utilization data</a:t>
-            </a:r>
-          </a:p>
-          <a:p>
-            <a:pPr marL="742950" lvl="1" indent="-285750">
-              <a:buFont typeface="Arial" panose="020B0604020202020204" pitchFamily="34" charset="0"/>
-              <a:buChar char="•"/>
-            </a:pPr>
-            <a:r>
-              <a:rPr lang="en-US" dirty="0"/>
-              <a:t>Send User data coming from face Id camera at Inspection station as DataStream</a:t>
+              <a:t>Maintain normal and prioritized jobs</a:t>
             </a:r>
           </a:p>
           <a:p>
@@ -10084,7 +9753,37 @@
             </a:pPr>
             <a:r>
               <a:rPr lang="en-US" dirty="0"/>
-              <a:t>IoT , Mill and Inspect component communicate via messages, events and commands</a:t>
+              <a:t>Mill and main component communicate via messages, events and commands</a:t>
+            </a:r>
+          </a:p>
+          <a:p>
+            <a:pPr marL="285750" indent="-285750">
+              <a:buFont typeface="Arial" panose="020B0604020202020204" pitchFamily="34" charset="0"/>
+              <a:buChar char="•"/>
+            </a:pPr>
+            <a:r>
+              <a:rPr lang="en-US" dirty="0"/>
+              <a:t>Job updates and machine updates are stored in a database for further analytics</a:t>
+            </a:r>
+          </a:p>
+          <a:p>
+            <a:pPr marL="285750" indent="-285750">
+              <a:buFont typeface="Arial" panose="020B0604020202020204" pitchFamily="34" charset="0"/>
+              <a:buChar char="•"/>
+            </a:pPr>
+            <a:r>
+              <a:rPr lang="en-US" dirty="0"/>
+              <a:t>Data transmitted is encrypted</a:t>
+            </a:r>
+          </a:p>
+          <a:p>
+            <a:pPr marL="285750" indent="-285750">
+              <a:buFont typeface="Arial" panose="020B0604020202020204" pitchFamily="34" charset="0"/>
+              <a:buChar char="•"/>
+            </a:pPr>
+            <a:r>
+              <a:rPr lang="en-US" dirty="0"/>
+              <a:t>Database access is passport protected</a:t>
             </a:r>
           </a:p>
           <a:p>
@@ -10096,7 +9795,990 @@
     </p:spTree>
     <p:extLst>
       <p:ext uri="{BB962C8B-B14F-4D97-AF65-F5344CB8AC3E}">
-        <p14:creationId xmlns:p14="http://schemas.microsoft.com/office/powerpoint/2010/main" val="495472231"/>
+        <p14:creationId xmlns:p14="http://schemas.microsoft.com/office/powerpoint/2010/main" val="1663967179"/>
+      </p:ext>
+    </p:extLst>
+  </p:cSld>
+  <p:clrMapOvr>
+    <a:masterClrMapping/>
+  </p:clrMapOvr>
+</p:sld>
+</file>
+
+<file path=ppt/slides/slide4.xml><?xml version="1.0" encoding="utf-8"?>
+<p:sld xmlns:a="http://schemas.openxmlformats.org/drawingml/2006/main" xmlns:r="http://schemas.openxmlformats.org/officeDocument/2006/relationships" xmlns:p="http://schemas.openxmlformats.org/presentationml/2006/main">
+  <p:cSld>
+    <p:spTree>
+      <p:nvGrpSpPr>
+        <p:cNvPr id="1" name=""/>
+        <p:cNvGrpSpPr/>
+        <p:nvPr/>
+      </p:nvGrpSpPr>
+      <p:grpSpPr>
+        <a:xfrm>
+          <a:off x="0" y="0"/>
+          <a:ext cx="0" cy="0"/>
+          <a:chOff x="0" y="0"/>
+          <a:chExt cx="0" cy="0"/>
+        </a:xfrm>
+      </p:grpSpPr>
+      <p:sp>
+        <p:nvSpPr>
+          <p:cNvPr id="2" name="Title 1">
+            <a:extLst>
+              <a:ext uri="{FF2B5EF4-FFF2-40B4-BE49-F238E27FC236}">
+                <a16:creationId xmlns:a16="http://schemas.microsoft.com/office/drawing/2014/main" id="{FA857126-3D6F-41C7-CF3C-8EE7F40B6BE8}"/>
+              </a:ext>
+            </a:extLst>
+          </p:cNvPr>
+          <p:cNvSpPr>
+            <a:spLocks noGrp="1"/>
+          </p:cNvSpPr>
+          <p:nvPr>
+            <p:ph type="title"/>
+          </p:nvPr>
+        </p:nvSpPr>
+        <p:spPr>
+          <a:xfrm>
+            <a:off x="838200" y="350995"/>
+            <a:ext cx="10515600" cy="1325563"/>
+          </a:xfrm>
+        </p:spPr>
+        <p:txBody>
+          <a:bodyPr/>
+          <a:lstStyle/>
+          <a:p>
+            <a:r>
+              <a:rPr lang="en-US" dirty="0"/>
+              <a:t>Solution Design</a:t>
+            </a:r>
+          </a:p>
+        </p:txBody>
+      </p:sp>
+      <p:sp>
+        <p:nvSpPr>
+          <p:cNvPr id="7" name="Rectangle: Rounded Corners 6">
+            <a:extLst>
+              <a:ext uri="{FF2B5EF4-FFF2-40B4-BE49-F238E27FC236}">
+                <a16:creationId xmlns:a16="http://schemas.microsoft.com/office/drawing/2014/main" id="{A54468B8-E743-1BC6-CD9E-5418247EB386}"/>
+              </a:ext>
+            </a:extLst>
+          </p:cNvPr>
+          <p:cNvSpPr/>
+          <p:nvPr/>
+        </p:nvSpPr>
+        <p:spPr>
+          <a:xfrm>
+            <a:off x="918641" y="3947172"/>
+            <a:ext cx="2617410" cy="1426029"/>
+          </a:xfrm>
+          <a:prstGeom prst="roundRect">
+            <a:avLst/>
+          </a:prstGeom>
+        </p:spPr>
+        <p:style>
+          <a:lnRef idx="2">
+            <a:schemeClr val="accent1">
+              <a:shade val="15000"/>
+            </a:schemeClr>
+          </a:lnRef>
+          <a:fillRef idx="1">
+            <a:schemeClr val="accent1"/>
+          </a:fillRef>
+          <a:effectRef idx="0">
+            <a:schemeClr val="accent1"/>
+          </a:effectRef>
+          <a:fontRef idx="minor">
+            <a:schemeClr val="lt1"/>
+          </a:fontRef>
+        </p:style>
+        <p:txBody>
+          <a:bodyPr rtlCol="0" anchor="ctr"/>
+          <a:lstStyle/>
+          <a:p>
+            <a:pPr algn="ctr"/>
+            <a:r>
+              <a:rPr lang="en-US" dirty="0"/>
+              <a:t>Main</a:t>
+            </a:r>
+          </a:p>
+        </p:txBody>
+      </p:sp>
+      <p:sp>
+        <p:nvSpPr>
+          <p:cNvPr id="8" name="Rectangle: Rounded Corners 7">
+            <a:extLst>
+              <a:ext uri="{FF2B5EF4-FFF2-40B4-BE49-F238E27FC236}">
+                <a16:creationId xmlns:a16="http://schemas.microsoft.com/office/drawing/2014/main" id="{EDED4C48-4670-8E9F-B702-4DFF46F1B295}"/>
+              </a:ext>
+            </a:extLst>
+          </p:cNvPr>
+          <p:cNvSpPr/>
+          <p:nvPr/>
+        </p:nvSpPr>
+        <p:spPr>
+          <a:xfrm>
+            <a:off x="5883032" y="3941620"/>
+            <a:ext cx="2668208" cy="1426029"/>
+          </a:xfrm>
+          <a:prstGeom prst="roundRect">
+            <a:avLst/>
+          </a:prstGeom>
+        </p:spPr>
+        <p:style>
+          <a:lnRef idx="2">
+            <a:schemeClr val="accent1">
+              <a:shade val="15000"/>
+            </a:schemeClr>
+          </a:lnRef>
+          <a:fillRef idx="1">
+            <a:schemeClr val="accent1"/>
+          </a:fillRef>
+          <a:effectRef idx="0">
+            <a:schemeClr val="accent1"/>
+          </a:effectRef>
+          <a:fontRef idx="minor">
+            <a:schemeClr val="lt1"/>
+          </a:fontRef>
+        </p:style>
+        <p:txBody>
+          <a:bodyPr rtlCol="0" anchor="ctr"/>
+          <a:lstStyle/>
+          <a:p>
+            <a:pPr algn="ctr"/>
+            <a:r>
+              <a:rPr lang="en-US" dirty="0"/>
+              <a:t>Mill</a:t>
+            </a:r>
+          </a:p>
+        </p:txBody>
+      </p:sp>
+      <p:sp>
+        <p:nvSpPr>
+          <p:cNvPr id="15" name="TextBox 14">
+            <a:extLst>
+              <a:ext uri="{FF2B5EF4-FFF2-40B4-BE49-F238E27FC236}">
+                <a16:creationId xmlns:a16="http://schemas.microsoft.com/office/drawing/2014/main" id="{3424CBE3-FEF8-34BB-F3A1-008D58B708FB}"/>
+              </a:ext>
+            </a:extLst>
+          </p:cNvPr>
+          <p:cNvSpPr txBox="1"/>
+          <p:nvPr/>
+        </p:nvSpPr>
+        <p:spPr>
+          <a:xfrm>
+            <a:off x="3753154" y="4750660"/>
+            <a:ext cx="1882019" cy="1754326"/>
+          </a:xfrm>
+          <a:prstGeom prst="rect">
+            <a:avLst/>
+          </a:prstGeom>
+          <a:noFill/>
+        </p:spPr>
+        <p:txBody>
+          <a:bodyPr wrap="square" rtlCol="0">
+            <a:spAutoFit/>
+          </a:bodyPr>
+          <a:lstStyle/>
+          <a:p>
+            <a:pPr marL="285750" indent="-285750">
+              <a:buFont typeface="Arial" panose="020B0604020202020204" pitchFamily="34" charset="0"/>
+              <a:buChar char="•"/>
+            </a:pPr>
+            <a:r>
+              <a:rPr lang="en-US" dirty="0"/>
+              <a:t>One main to many mills</a:t>
+            </a:r>
+          </a:p>
+          <a:p>
+            <a:pPr marL="285750" indent="-285750">
+              <a:buFont typeface="Arial" panose="020B0604020202020204" pitchFamily="34" charset="0"/>
+              <a:buChar char="•"/>
+            </a:pPr>
+            <a:r>
+              <a:rPr lang="en-US" dirty="0"/>
+              <a:t>Messages</a:t>
+            </a:r>
+          </a:p>
+          <a:p>
+            <a:pPr marL="285750" indent="-285750">
+              <a:buFont typeface="Arial" panose="020B0604020202020204" pitchFamily="34" charset="0"/>
+              <a:buChar char="•"/>
+            </a:pPr>
+            <a:r>
+              <a:rPr lang="en-US" dirty="0"/>
+              <a:t>Commands</a:t>
+            </a:r>
+          </a:p>
+          <a:p>
+            <a:pPr marL="285750" indent="-285750">
+              <a:buFont typeface="Arial" panose="020B0604020202020204" pitchFamily="34" charset="0"/>
+              <a:buChar char="•"/>
+            </a:pPr>
+            <a:r>
+              <a:rPr lang="en-US" dirty="0"/>
+              <a:t>Events</a:t>
+            </a:r>
+          </a:p>
+          <a:p>
+            <a:pPr marL="285750" indent="-285750">
+              <a:buFont typeface="Arial" panose="020B0604020202020204" pitchFamily="34" charset="0"/>
+              <a:buChar char="•"/>
+            </a:pPr>
+            <a:r>
+              <a:rPr lang="en-US" dirty="0"/>
+              <a:t>Streams</a:t>
+            </a:r>
+          </a:p>
+        </p:txBody>
+      </p:sp>
+      <p:sp>
+        <p:nvSpPr>
+          <p:cNvPr id="16" name="Flowchart: Magnetic Disk 15">
+            <a:extLst>
+              <a:ext uri="{FF2B5EF4-FFF2-40B4-BE49-F238E27FC236}">
+                <a16:creationId xmlns:a16="http://schemas.microsoft.com/office/drawing/2014/main" id="{4B2AEBA4-6D17-D105-3973-EAD1B772F0BB}"/>
+              </a:ext>
+            </a:extLst>
+          </p:cNvPr>
+          <p:cNvSpPr/>
+          <p:nvPr/>
+        </p:nvSpPr>
+        <p:spPr>
+          <a:xfrm>
+            <a:off x="9899188" y="3752439"/>
+            <a:ext cx="1398210" cy="1738799"/>
+          </a:xfrm>
+          <a:prstGeom prst="flowChartMagneticDisk">
+            <a:avLst/>
+          </a:prstGeom>
+        </p:spPr>
+        <p:style>
+          <a:lnRef idx="2">
+            <a:schemeClr val="accent1">
+              <a:shade val="15000"/>
+            </a:schemeClr>
+          </a:lnRef>
+          <a:fillRef idx="1">
+            <a:schemeClr val="accent1"/>
+          </a:fillRef>
+          <a:effectRef idx="0">
+            <a:schemeClr val="accent1"/>
+          </a:effectRef>
+          <a:fontRef idx="minor">
+            <a:schemeClr val="lt1"/>
+          </a:fontRef>
+        </p:style>
+        <p:txBody>
+          <a:bodyPr rtlCol="0" anchor="ctr"/>
+          <a:lstStyle/>
+          <a:p>
+            <a:pPr algn="ctr"/>
+            <a:endParaRPr lang="en-US"/>
+          </a:p>
+        </p:txBody>
+      </p:sp>
+      <p:sp>
+        <p:nvSpPr>
+          <p:cNvPr id="28" name="Rectangle: Rounded Corners 27">
+            <a:extLst>
+              <a:ext uri="{FF2B5EF4-FFF2-40B4-BE49-F238E27FC236}">
+                <a16:creationId xmlns:a16="http://schemas.microsoft.com/office/drawing/2014/main" id="{F310B0A8-2831-823B-B0D3-C65C39EC02B1}"/>
+              </a:ext>
+            </a:extLst>
+          </p:cNvPr>
+          <p:cNvSpPr/>
+          <p:nvPr/>
+        </p:nvSpPr>
+        <p:spPr>
+          <a:xfrm>
+            <a:off x="5883032" y="1339169"/>
+            <a:ext cx="2668208" cy="1426029"/>
+          </a:xfrm>
+          <a:prstGeom prst="roundRect">
+            <a:avLst/>
+          </a:prstGeom>
+        </p:spPr>
+        <p:style>
+          <a:lnRef idx="2">
+            <a:schemeClr val="accent1">
+              <a:shade val="15000"/>
+            </a:schemeClr>
+          </a:lnRef>
+          <a:fillRef idx="1">
+            <a:schemeClr val="accent1"/>
+          </a:fillRef>
+          <a:effectRef idx="0">
+            <a:schemeClr val="accent1"/>
+          </a:effectRef>
+          <a:fontRef idx="minor">
+            <a:schemeClr val="lt1"/>
+          </a:fontRef>
+        </p:style>
+        <p:txBody>
+          <a:bodyPr rtlCol="0" anchor="ctr"/>
+          <a:lstStyle/>
+          <a:p>
+            <a:pPr algn="ctr"/>
+            <a:r>
+              <a:rPr lang="en-US" dirty="0"/>
+              <a:t>Component</a:t>
+            </a:r>
+          </a:p>
+        </p:txBody>
+      </p:sp>
+      <p:cxnSp>
+        <p:nvCxnSpPr>
+          <p:cNvPr id="30" name="Straight Arrow Connector 29">
+            <a:extLst>
+              <a:ext uri="{FF2B5EF4-FFF2-40B4-BE49-F238E27FC236}">
+                <a16:creationId xmlns:a16="http://schemas.microsoft.com/office/drawing/2014/main" id="{69CA339B-6BCF-BBE9-E190-4F0FE7A41DF9}"/>
+              </a:ext>
+            </a:extLst>
+          </p:cNvPr>
+          <p:cNvCxnSpPr>
+            <a:cxnSpLocks/>
+            <a:stCxn id="8" idx="0"/>
+            <a:endCxn id="28" idx="2"/>
+          </p:cNvCxnSpPr>
+          <p:nvPr/>
+        </p:nvCxnSpPr>
+        <p:spPr>
+          <a:xfrm flipV="1">
+            <a:off x="7217136" y="2765198"/>
+            <a:ext cx="0" cy="1176422"/>
+          </a:xfrm>
+          <a:prstGeom prst="straightConnector1">
+            <a:avLst/>
+          </a:prstGeom>
+          <a:ln>
+            <a:tailEnd type="triangle"/>
+          </a:ln>
+        </p:spPr>
+        <p:style>
+          <a:lnRef idx="2">
+            <a:schemeClr val="accent1"/>
+          </a:lnRef>
+          <a:fillRef idx="0">
+            <a:schemeClr val="accent1"/>
+          </a:fillRef>
+          <a:effectRef idx="1">
+            <a:schemeClr val="accent1"/>
+          </a:effectRef>
+          <a:fontRef idx="minor">
+            <a:schemeClr val="tx1"/>
+          </a:fontRef>
+        </p:style>
+      </p:cxnSp>
+      <p:sp>
+        <p:nvSpPr>
+          <p:cNvPr id="31" name="TextBox 30">
+            <a:extLst>
+              <a:ext uri="{FF2B5EF4-FFF2-40B4-BE49-F238E27FC236}">
+                <a16:creationId xmlns:a16="http://schemas.microsoft.com/office/drawing/2014/main" id="{FE30D84B-8D25-18FB-BCC0-55B9EAB152EB}"/>
+              </a:ext>
+            </a:extLst>
+          </p:cNvPr>
+          <p:cNvSpPr txBox="1"/>
+          <p:nvPr/>
+        </p:nvSpPr>
+        <p:spPr>
+          <a:xfrm>
+            <a:off x="8902096" y="1289393"/>
+            <a:ext cx="2307619" cy="923330"/>
+          </a:xfrm>
+          <a:prstGeom prst="rect">
+            <a:avLst/>
+          </a:prstGeom>
+          <a:noFill/>
+        </p:spPr>
+        <p:txBody>
+          <a:bodyPr wrap="none" rtlCol="0">
+            <a:spAutoFit/>
+          </a:bodyPr>
+          <a:lstStyle/>
+          <a:p>
+            <a:r>
+              <a:rPr lang="en-US" dirty="0"/>
+              <a:t>Abstract class to </a:t>
+            </a:r>
+          </a:p>
+          <a:p>
+            <a:r>
+              <a:rPr lang="en-US" dirty="0"/>
+              <a:t>support different </a:t>
+            </a:r>
+          </a:p>
+          <a:p>
+            <a:r>
+              <a:rPr lang="en-US" dirty="0"/>
+              <a:t>Types of components</a:t>
+            </a:r>
+          </a:p>
+        </p:txBody>
+      </p:sp>
+      <p:sp>
+        <p:nvSpPr>
+          <p:cNvPr id="42" name="Rectangle: Rounded Corners 41">
+            <a:extLst>
+              <a:ext uri="{FF2B5EF4-FFF2-40B4-BE49-F238E27FC236}">
+                <a16:creationId xmlns:a16="http://schemas.microsoft.com/office/drawing/2014/main" id="{57CBE29B-5B9B-0EDC-7963-23AD84D104A7}"/>
+              </a:ext>
+            </a:extLst>
+          </p:cNvPr>
+          <p:cNvSpPr/>
+          <p:nvPr/>
+        </p:nvSpPr>
+        <p:spPr>
+          <a:xfrm>
+            <a:off x="918641" y="1391075"/>
+            <a:ext cx="2617410" cy="1426029"/>
+          </a:xfrm>
+          <a:prstGeom prst="roundRect">
+            <a:avLst/>
+          </a:prstGeom>
+        </p:spPr>
+        <p:style>
+          <a:lnRef idx="2">
+            <a:schemeClr val="accent1">
+              <a:shade val="15000"/>
+            </a:schemeClr>
+          </a:lnRef>
+          <a:fillRef idx="1">
+            <a:schemeClr val="accent1"/>
+          </a:fillRef>
+          <a:effectRef idx="0">
+            <a:schemeClr val="accent1"/>
+          </a:effectRef>
+          <a:fontRef idx="minor">
+            <a:schemeClr val="lt1"/>
+          </a:fontRef>
+        </p:style>
+        <p:txBody>
+          <a:bodyPr rtlCol="0" anchor="ctr"/>
+          <a:lstStyle/>
+          <a:p>
+            <a:pPr algn="ctr"/>
+            <a:r>
+              <a:rPr lang="en-US" dirty="0"/>
+              <a:t>Normal Messages</a:t>
+            </a:r>
+          </a:p>
+          <a:p>
+            <a:pPr algn="ctr"/>
+            <a:r>
+              <a:rPr lang="en-US" dirty="0"/>
+              <a:t>Priority Messages</a:t>
+            </a:r>
+          </a:p>
+        </p:txBody>
+      </p:sp>
+      <p:cxnSp>
+        <p:nvCxnSpPr>
+          <p:cNvPr id="45" name="Straight Arrow Connector 44">
+            <a:extLst>
+              <a:ext uri="{FF2B5EF4-FFF2-40B4-BE49-F238E27FC236}">
+                <a16:creationId xmlns:a16="http://schemas.microsoft.com/office/drawing/2014/main" id="{DB8AAC67-6929-63E4-EDF7-9CC599C09238}"/>
+              </a:ext>
+            </a:extLst>
+          </p:cNvPr>
+          <p:cNvCxnSpPr>
+            <a:cxnSpLocks/>
+            <a:stCxn id="42" idx="2"/>
+            <a:endCxn id="7" idx="0"/>
+          </p:cNvCxnSpPr>
+          <p:nvPr/>
+        </p:nvCxnSpPr>
+        <p:spPr>
+          <a:xfrm>
+            <a:off x="2227346" y="2817104"/>
+            <a:ext cx="0" cy="1130068"/>
+          </a:xfrm>
+          <a:prstGeom prst="straightConnector1">
+            <a:avLst/>
+          </a:prstGeom>
+          <a:ln>
+            <a:tailEnd type="triangle"/>
+          </a:ln>
+        </p:spPr>
+        <p:style>
+          <a:lnRef idx="2">
+            <a:schemeClr val="accent1"/>
+          </a:lnRef>
+          <a:fillRef idx="0">
+            <a:schemeClr val="accent1"/>
+          </a:fillRef>
+          <a:effectRef idx="1">
+            <a:schemeClr val="accent1"/>
+          </a:effectRef>
+          <a:fontRef idx="minor">
+            <a:schemeClr val="tx1"/>
+          </a:fontRef>
+        </p:style>
+      </p:cxnSp>
+      <p:sp>
+        <p:nvSpPr>
+          <p:cNvPr id="49" name="TextBox 48">
+            <a:extLst>
+              <a:ext uri="{FF2B5EF4-FFF2-40B4-BE49-F238E27FC236}">
+                <a16:creationId xmlns:a16="http://schemas.microsoft.com/office/drawing/2014/main" id="{BC7E66F1-9DF5-5630-7F22-75133748EFB7}"/>
+              </a:ext>
+            </a:extLst>
+          </p:cNvPr>
+          <p:cNvSpPr txBox="1"/>
+          <p:nvPr/>
+        </p:nvSpPr>
+        <p:spPr>
+          <a:xfrm>
+            <a:off x="9740754" y="5640238"/>
+            <a:ext cx="2347117" cy="646331"/>
+          </a:xfrm>
+          <a:prstGeom prst="rect">
+            <a:avLst/>
+          </a:prstGeom>
+          <a:noFill/>
+        </p:spPr>
+        <p:txBody>
+          <a:bodyPr wrap="none" rtlCol="0">
+            <a:spAutoFit/>
+          </a:bodyPr>
+          <a:lstStyle/>
+          <a:p>
+            <a:r>
+              <a:rPr lang="en-US" dirty="0"/>
+              <a:t>Store job updates </a:t>
+            </a:r>
+          </a:p>
+          <a:p>
+            <a:r>
+              <a:rPr lang="en-US" dirty="0"/>
+              <a:t>and machine updates</a:t>
+            </a:r>
+          </a:p>
+        </p:txBody>
+      </p:sp>
+      <p:sp>
+        <p:nvSpPr>
+          <p:cNvPr id="50" name="TextBox 49">
+            <a:extLst>
+              <a:ext uri="{FF2B5EF4-FFF2-40B4-BE49-F238E27FC236}">
+                <a16:creationId xmlns:a16="http://schemas.microsoft.com/office/drawing/2014/main" id="{4DC6054E-9836-323F-A895-6872231267B3}"/>
+              </a:ext>
+            </a:extLst>
+          </p:cNvPr>
+          <p:cNvSpPr txBox="1"/>
+          <p:nvPr/>
+        </p:nvSpPr>
+        <p:spPr>
+          <a:xfrm>
+            <a:off x="6981371" y="3091543"/>
+            <a:ext cx="932371" cy="369332"/>
+          </a:xfrm>
+          <a:prstGeom prst="rect">
+            <a:avLst/>
+          </a:prstGeom>
+          <a:noFill/>
+        </p:spPr>
+        <p:txBody>
+          <a:bodyPr wrap="none" rtlCol="0">
+            <a:spAutoFit/>
+          </a:bodyPr>
+          <a:lstStyle/>
+          <a:p>
+            <a:r>
+              <a:rPr lang="en-US" dirty="0"/>
+              <a:t>inherits</a:t>
+            </a:r>
+          </a:p>
+        </p:txBody>
+      </p:sp>
+      <p:cxnSp>
+        <p:nvCxnSpPr>
+          <p:cNvPr id="52" name="Straight Arrow Connector 51">
+            <a:extLst>
+              <a:ext uri="{FF2B5EF4-FFF2-40B4-BE49-F238E27FC236}">
+                <a16:creationId xmlns:a16="http://schemas.microsoft.com/office/drawing/2014/main" id="{FB5A6459-89F6-B31E-F2BE-996D5C81384B}"/>
+              </a:ext>
+            </a:extLst>
+          </p:cNvPr>
+          <p:cNvCxnSpPr>
+            <a:cxnSpLocks/>
+            <a:stCxn id="7" idx="3"/>
+            <a:endCxn id="8" idx="1"/>
+          </p:cNvCxnSpPr>
+          <p:nvPr/>
+        </p:nvCxnSpPr>
+        <p:spPr>
+          <a:xfrm flipV="1">
+            <a:off x="3536051" y="4654635"/>
+            <a:ext cx="2346981" cy="5552"/>
+          </a:xfrm>
+          <a:prstGeom prst="straightConnector1">
+            <a:avLst/>
+          </a:prstGeom>
+          <a:ln>
+            <a:headEnd type="triangle"/>
+            <a:tailEnd type="triangle"/>
+          </a:ln>
+        </p:spPr>
+        <p:style>
+          <a:lnRef idx="2">
+            <a:schemeClr val="accent1"/>
+          </a:lnRef>
+          <a:fillRef idx="0">
+            <a:schemeClr val="accent1"/>
+          </a:fillRef>
+          <a:effectRef idx="1">
+            <a:schemeClr val="accent1"/>
+          </a:effectRef>
+          <a:fontRef idx="minor">
+            <a:schemeClr val="tx1"/>
+          </a:fontRef>
+        </p:style>
+      </p:cxnSp>
+      <p:cxnSp>
+        <p:nvCxnSpPr>
+          <p:cNvPr id="62" name="Connector: Elbow 61">
+            <a:extLst>
+              <a:ext uri="{FF2B5EF4-FFF2-40B4-BE49-F238E27FC236}">
+                <a16:creationId xmlns:a16="http://schemas.microsoft.com/office/drawing/2014/main" id="{FC5CC69C-3B28-12D2-6383-6A8C2992A145}"/>
+              </a:ext>
+            </a:extLst>
+          </p:cNvPr>
+          <p:cNvCxnSpPr>
+            <a:stCxn id="7" idx="2"/>
+            <a:endCxn id="16" idx="3"/>
+          </p:cNvCxnSpPr>
+          <p:nvPr/>
+        </p:nvCxnSpPr>
+        <p:spPr>
+          <a:xfrm rot="16200000" flipH="1">
+            <a:off x="6353801" y="1246745"/>
+            <a:ext cx="118037" cy="8370947"/>
+          </a:xfrm>
+          <a:prstGeom prst="bentConnector3">
+            <a:avLst>
+              <a:gd name="adj1" fmla="val 1043747"/>
+            </a:avLst>
+          </a:prstGeom>
+          <a:ln>
+            <a:tailEnd type="triangle"/>
+          </a:ln>
+        </p:spPr>
+        <p:style>
+          <a:lnRef idx="2">
+            <a:schemeClr val="accent1"/>
+          </a:lnRef>
+          <a:fillRef idx="0">
+            <a:schemeClr val="accent1"/>
+          </a:fillRef>
+          <a:effectRef idx="1">
+            <a:schemeClr val="accent1"/>
+          </a:effectRef>
+          <a:fontRef idx="minor">
+            <a:schemeClr val="tx1"/>
+          </a:fontRef>
+        </p:style>
+      </p:cxnSp>
+      <p:sp>
+        <p:nvSpPr>
+          <p:cNvPr id="67" name="TextBox 66">
+            <a:extLst>
+              <a:ext uri="{FF2B5EF4-FFF2-40B4-BE49-F238E27FC236}">
+                <a16:creationId xmlns:a16="http://schemas.microsoft.com/office/drawing/2014/main" id="{8497885B-9618-8B60-5626-F24B82CB559C}"/>
+              </a:ext>
+            </a:extLst>
+          </p:cNvPr>
+          <p:cNvSpPr txBox="1"/>
+          <p:nvPr/>
+        </p:nvSpPr>
+        <p:spPr>
+          <a:xfrm>
+            <a:off x="3536051" y="1673675"/>
+            <a:ext cx="1358385" cy="646331"/>
+          </a:xfrm>
+          <a:prstGeom prst="rect">
+            <a:avLst/>
+          </a:prstGeom>
+          <a:noFill/>
+        </p:spPr>
+        <p:txBody>
+          <a:bodyPr wrap="none" rtlCol="0">
+            <a:spAutoFit/>
+          </a:bodyPr>
+          <a:lstStyle/>
+          <a:p>
+            <a:r>
+              <a:rPr lang="en-US" dirty="0"/>
+              <a:t>Thread Safe</a:t>
+            </a:r>
+          </a:p>
+          <a:p>
+            <a:r>
+              <a:rPr lang="en-US" dirty="0"/>
+              <a:t>collections</a:t>
+            </a:r>
+          </a:p>
+        </p:txBody>
+      </p:sp>
+      <p:sp>
+        <p:nvSpPr>
+          <p:cNvPr id="69" name="TextBox 68">
+            <a:extLst>
+              <a:ext uri="{FF2B5EF4-FFF2-40B4-BE49-F238E27FC236}">
+                <a16:creationId xmlns:a16="http://schemas.microsoft.com/office/drawing/2014/main" id="{C7875A7E-2A72-6B84-2415-45CB044ADE60}"/>
+              </a:ext>
+            </a:extLst>
+          </p:cNvPr>
+          <p:cNvSpPr txBox="1"/>
+          <p:nvPr/>
+        </p:nvSpPr>
+        <p:spPr>
+          <a:xfrm>
+            <a:off x="2227346" y="3168743"/>
+            <a:ext cx="546945" cy="369332"/>
+          </a:xfrm>
+          <a:prstGeom prst="rect">
+            <a:avLst/>
+          </a:prstGeom>
+          <a:noFill/>
+        </p:spPr>
+        <p:txBody>
+          <a:bodyPr wrap="none" rtlCol="0">
+            <a:spAutoFit/>
+          </a:bodyPr>
+          <a:lstStyle/>
+          <a:p>
+            <a:r>
+              <a:rPr lang="en-US" dirty="0"/>
+              <a:t>has</a:t>
+            </a:r>
+          </a:p>
+        </p:txBody>
+      </p:sp>
+    </p:spTree>
+    <p:extLst>
+      <p:ext uri="{BB962C8B-B14F-4D97-AF65-F5344CB8AC3E}">
+        <p14:creationId xmlns:p14="http://schemas.microsoft.com/office/powerpoint/2010/main" val="2679963682"/>
+      </p:ext>
+    </p:extLst>
+  </p:cSld>
+  <p:clrMapOvr>
+    <a:masterClrMapping/>
+  </p:clrMapOvr>
+</p:sld>
+</file>
+
+<file path=ppt/slides/slide5.xml><?xml version="1.0" encoding="utf-8"?>
+<p:sld xmlns:a="http://schemas.openxmlformats.org/drawingml/2006/main" xmlns:r="http://schemas.openxmlformats.org/officeDocument/2006/relationships" xmlns:p="http://schemas.openxmlformats.org/presentationml/2006/main">
+  <p:cSld>
+    <p:spTree>
+      <p:nvGrpSpPr>
+        <p:cNvPr id="1" name=""/>
+        <p:cNvGrpSpPr/>
+        <p:nvPr/>
+      </p:nvGrpSpPr>
+      <p:grpSpPr>
+        <a:xfrm>
+          <a:off x="0" y="0"/>
+          <a:ext cx="0" cy="0"/>
+          <a:chOff x="0" y="0"/>
+          <a:chExt cx="0" cy="0"/>
+        </a:xfrm>
+      </p:grpSpPr>
+      <p:sp>
+        <p:nvSpPr>
+          <p:cNvPr id="2" name="Title 1">
+            <a:extLst>
+              <a:ext uri="{FF2B5EF4-FFF2-40B4-BE49-F238E27FC236}">
+                <a16:creationId xmlns:a16="http://schemas.microsoft.com/office/drawing/2014/main" id="{FA857126-3D6F-41C7-CF3C-8EE7F40B6BE8}"/>
+              </a:ext>
+            </a:extLst>
+          </p:cNvPr>
+          <p:cNvSpPr>
+            <a:spLocks noGrp="1"/>
+          </p:cNvSpPr>
+          <p:nvPr>
+            <p:ph type="title"/>
+          </p:nvPr>
+        </p:nvSpPr>
+        <p:spPr>
+          <a:xfrm>
+            <a:off x="838200" y="371315"/>
+            <a:ext cx="10515600" cy="1325563"/>
+          </a:xfrm>
+        </p:spPr>
+        <p:txBody>
+          <a:bodyPr/>
+          <a:lstStyle/>
+          <a:p>
+            <a:r>
+              <a:rPr lang="en-US" dirty="0"/>
+              <a:t>Component Technicals</a:t>
+            </a:r>
+          </a:p>
+        </p:txBody>
+      </p:sp>
+      <p:sp>
+        <p:nvSpPr>
+          <p:cNvPr id="5" name="Content Placeholder 4">
+            <a:extLst>
+              <a:ext uri="{FF2B5EF4-FFF2-40B4-BE49-F238E27FC236}">
+                <a16:creationId xmlns:a16="http://schemas.microsoft.com/office/drawing/2014/main" id="{7F9E480A-D377-0E31-C595-F676DF456009}"/>
+              </a:ext>
+            </a:extLst>
+          </p:cNvPr>
+          <p:cNvSpPr>
+            <a:spLocks noGrp="1"/>
+          </p:cNvSpPr>
+          <p:nvPr>
+            <p:ph idx="1"/>
+          </p:nvPr>
+        </p:nvSpPr>
+        <p:spPr>
+          <a:xfrm>
+            <a:off x="838200" y="1825625"/>
+            <a:ext cx="10515600" cy="4661060"/>
+          </a:xfrm>
+        </p:spPr>
+        <p:txBody>
+          <a:bodyPr>
+            <a:normAutofit fontScale="70000" lnSpcReduction="20000"/>
+          </a:bodyPr>
+          <a:lstStyle/>
+          <a:p>
+            <a:r>
+              <a:rPr lang="en-US" dirty="0"/>
+              <a:t>Main</a:t>
+            </a:r>
+          </a:p>
+          <a:p>
+            <a:pPr lvl="1"/>
+            <a:r>
+              <a:rPr lang="en-US" dirty="0"/>
+              <a:t>Maintains normal and priority queue</a:t>
+            </a:r>
+          </a:p>
+          <a:p>
+            <a:pPr lvl="1"/>
+            <a:r>
+              <a:rPr lang="en-US" dirty="0"/>
+              <a:t>Maintains callback to mills</a:t>
+            </a:r>
+          </a:p>
+          <a:p>
+            <a:pPr lvl="1"/>
+            <a:r>
+              <a:rPr lang="en-US" dirty="0"/>
+              <a:t>Issues commands, messages and events</a:t>
+            </a:r>
+          </a:p>
+          <a:p>
+            <a:pPr lvl="1"/>
+            <a:r>
+              <a:rPr lang="en-US" dirty="0"/>
+              <a:t>Stores updates in the database</a:t>
+            </a:r>
+          </a:p>
+          <a:p>
+            <a:pPr lvl="1"/>
+            <a:r>
+              <a:rPr lang="en-US" dirty="0"/>
+              <a:t>Implemented as a class type</a:t>
+            </a:r>
+          </a:p>
+          <a:p>
+            <a:r>
+              <a:rPr lang="en-US" dirty="0"/>
+              <a:t>Mill</a:t>
+            </a:r>
+          </a:p>
+          <a:p>
+            <a:pPr lvl="1"/>
+            <a:r>
+              <a:rPr lang="en-US" dirty="0"/>
+              <a:t>Process jobs </a:t>
+            </a:r>
+          </a:p>
+          <a:p>
+            <a:pPr lvl="1"/>
+            <a:r>
+              <a:rPr lang="en-US" dirty="0"/>
+              <a:t>Publish job updates via messages and events</a:t>
+            </a:r>
+          </a:p>
+          <a:p>
+            <a:pPr lvl="1"/>
+            <a:r>
+              <a:rPr lang="en-US" dirty="0"/>
+              <a:t>Publish machine updates via messages and events</a:t>
+            </a:r>
+          </a:p>
+          <a:p>
+            <a:pPr lvl="1"/>
+            <a:r>
+              <a:rPr lang="en-US" dirty="0"/>
+              <a:t>Issues commands like calibrate</a:t>
+            </a:r>
+          </a:p>
+          <a:p>
+            <a:pPr lvl="1"/>
+            <a:r>
+              <a:rPr lang="en-US" dirty="0"/>
+              <a:t>Issues data stream to monitor it’s health</a:t>
+            </a:r>
+          </a:p>
+          <a:p>
+            <a:pPr lvl="1"/>
+            <a:r>
+              <a:rPr lang="en-US" dirty="0"/>
+              <a:t>Implemented as a class type</a:t>
+            </a:r>
+          </a:p>
+          <a:p>
+            <a:r>
+              <a:rPr lang="en-US" dirty="0"/>
+              <a:t>Message</a:t>
+            </a:r>
+          </a:p>
+          <a:p>
+            <a:pPr lvl="1"/>
+            <a:r>
+              <a:rPr lang="en-US" dirty="0"/>
+              <a:t>Header – Sender, Date, priority , feedback, encrypt</a:t>
+            </a:r>
+          </a:p>
+          <a:p>
+            <a:pPr lvl="2"/>
+            <a:r>
+              <a:rPr lang="en-US" dirty="0"/>
+              <a:t>Implemented has a record type, immutable</a:t>
+            </a:r>
+          </a:p>
+          <a:p>
+            <a:pPr lvl="1"/>
+            <a:r>
+              <a:rPr lang="en-US" dirty="0"/>
+              <a:t>Body – content</a:t>
+            </a:r>
+          </a:p>
+          <a:p>
+            <a:pPr lvl="2"/>
+            <a:r>
+              <a:rPr lang="en-US" dirty="0"/>
+              <a:t>Implemented has a record type, immutable</a:t>
+            </a:r>
+          </a:p>
+          <a:p>
+            <a:pPr lvl="2"/>
+            <a:endParaRPr lang="en-US" dirty="0"/>
+          </a:p>
+        </p:txBody>
+      </p:sp>
+    </p:spTree>
+    <p:extLst>
+      <p:ext uri="{BB962C8B-B14F-4D97-AF65-F5344CB8AC3E}">
+        <p14:creationId xmlns:p14="http://schemas.microsoft.com/office/powerpoint/2010/main" val="2722588425"/>
       </p:ext>
     </p:extLst>
   </p:cSld>

</xml_diff>

<commit_message>
ppt update with class dia
</commit_message>
<xml_diff>
--- a/docs/Assignment.pptx
+++ b/docs/Assignment.pptx
@@ -11,6 +11,7 @@
     <p:sldId id="259" r:id="rId5"/>
     <p:sldId id="263" r:id="rId6"/>
     <p:sldId id="262" r:id="rId7"/>
+    <p:sldId id="264" r:id="rId8"/>
   </p:sldIdLst>
   <p:sldSz cx="12192000" cy="6858000"/>
   <p:notesSz cx="6858000" cy="9144000"/>
@@ -9303,7 +9304,7 @@
           <a:p>
             <a:r>
               <a:rPr lang="en-US" dirty="0"/>
-              <a:t>IOT MANUFACTURING</a:t>
+              <a:t>MANUFACTURING</a:t>
             </a:r>
           </a:p>
         </p:txBody>
@@ -9389,7 +9390,7 @@
           <a:p>
             <a:r>
               <a:rPr lang="en-US" dirty="0"/>
-              <a:t>Use Case – IOT Manufacturing</a:t>
+              <a:t>Use Case –Manufacturing</a:t>
             </a:r>
           </a:p>
         </p:txBody>
@@ -9409,7 +9410,7 @@
         <p:spPr>
           <a:xfrm>
             <a:off x="5908040" y="1690688"/>
-            <a:ext cx="5659120" cy="3970318"/>
+            <a:ext cx="5659120" cy="3693319"/>
           </a:xfrm>
           <a:prstGeom prst="rect">
             <a:avLst/>
@@ -9479,16 +9480,6 @@
             <a:r>
               <a:rPr lang="en-US" dirty="0"/>
               <a:t>Cancel Job based on dentist’s request</a:t>
-            </a:r>
-          </a:p>
-          <a:p>
-            <a:pPr marL="742950" lvl="1" indent="-285750">
-              <a:buFont typeface="Arial" panose="020B0604020202020204" pitchFamily="34" charset="0"/>
-              <a:buChar char="•"/>
-            </a:pPr>
-            <a:r>
-              <a:rPr lang="en-US" dirty="0"/>
-              <a:t>Transfer Job from one mill to another mill</a:t>
             </a:r>
           </a:p>
           <a:p>
@@ -9599,7 +9590,7 @@
           <a:p>
             <a:r>
               <a:rPr lang="en-US" dirty="0"/>
-              <a:t>Use Case – IOT Manufacturing Elaboration</a:t>
+              <a:t>Use Case –Manufacturing Elaboration</a:t>
             </a:r>
           </a:p>
         </p:txBody>
@@ -9645,7 +9636,7 @@
         <p:spPr>
           <a:xfrm>
             <a:off x="5933440" y="1588094"/>
-            <a:ext cx="5659120" cy="5078313"/>
+            <a:ext cx="5659120" cy="4801314"/>
           </a:xfrm>
           <a:prstGeom prst="rect">
             <a:avLst/>
@@ -9705,16 +9696,6 @@
             <a:r>
               <a:rPr lang="en-US" dirty="0"/>
               <a:t>Cancel Job</a:t>
-            </a:r>
-          </a:p>
-          <a:p>
-            <a:pPr marL="742950" lvl="1" indent="-285750">
-              <a:buFont typeface="Arial" panose="020B0604020202020204" pitchFamily="34" charset="0"/>
-              <a:buChar char="•"/>
-            </a:pPr>
-            <a:r>
-              <a:rPr lang="en-US" dirty="0"/>
-              <a:t>Transfer Job</a:t>
             </a:r>
           </a:p>
           <a:p>
@@ -11491,7 +11472,7 @@
             <a:pPr lvl="1"/>
             <a:r>
               <a:rPr lang="en-US" dirty="0"/>
-              <a:t>Issues data stream to monitor it’s health</a:t>
+              <a:t>Issues temperature data stream to monitor it’s health</a:t>
             </a:r>
           </a:p>
           <a:p>
@@ -11545,6 +11526,94 @@
     <p:extLst>
       <p:ext uri="{BB962C8B-B14F-4D97-AF65-F5344CB8AC3E}">
         <p14:creationId xmlns:p14="http://schemas.microsoft.com/office/powerpoint/2010/main" val="2722588425"/>
+      </p:ext>
+    </p:extLst>
+  </p:cSld>
+  <p:clrMapOvr>
+    <a:masterClrMapping/>
+  </p:clrMapOvr>
+</p:sld>
+</file>
+
+<file path=ppt/slides/slide7.xml><?xml version="1.0" encoding="utf-8"?>
+<p:sld xmlns:a="http://schemas.openxmlformats.org/drawingml/2006/main" xmlns:r="http://schemas.openxmlformats.org/officeDocument/2006/relationships" xmlns:p="http://schemas.openxmlformats.org/presentationml/2006/main">
+  <p:cSld>
+    <p:spTree>
+      <p:nvGrpSpPr>
+        <p:cNvPr id="1" name=""/>
+        <p:cNvGrpSpPr/>
+        <p:nvPr/>
+      </p:nvGrpSpPr>
+      <p:grpSpPr>
+        <a:xfrm>
+          <a:off x="0" y="0"/>
+          <a:ext cx="0" cy="0"/>
+          <a:chOff x="0" y="0"/>
+          <a:chExt cx="0" cy="0"/>
+        </a:xfrm>
+      </p:grpSpPr>
+      <p:sp>
+        <p:nvSpPr>
+          <p:cNvPr id="2" name="Title 1">
+            <a:extLst>
+              <a:ext uri="{FF2B5EF4-FFF2-40B4-BE49-F238E27FC236}">
+                <a16:creationId xmlns:a16="http://schemas.microsoft.com/office/drawing/2014/main" id="{F0B59BBC-99DA-52FC-EDBC-4C691B41DC4D}"/>
+              </a:ext>
+            </a:extLst>
+          </p:cNvPr>
+          <p:cNvSpPr>
+            <a:spLocks noGrp="1"/>
+          </p:cNvSpPr>
+          <p:nvPr>
+            <p:ph type="title"/>
+          </p:nvPr>
+        </p:nvSpPr>
+        <p:spPr/>
+        <p:txBody>
+          <a:bodyPr/>
+          <a:lstStyle/>
+          <a:p>
+            <a:r>
+              <a:rPr lang="en-US" dirty="0"/>
+              <a:t>Class Diagram</a:t>
+            </a:r>
+          </a:p>
+        </p:txBody>
+      </p:sp>
+      <p:pic>
+        <p:nvPicPr>
+          <p:cNvPr id="5" name="Picture 4">
+            <a:extLst>
+              <a:ext uri="{FF2B5EF4-FFF2-40B4-BE49-F238E27FC236}">
+                <a16:creationId xmlns:a16="http://schemas.microsoft.com/office/drawing/2014/main" id="{158C9F91-0383-CFDD-0C9D-77429A16AC30}"/>
+              </a:ext>
+            </a:extLst>
+          </p:cNvPr>
+          <p:cNvPicPr>
+            <a:picLocks noChangeAspect="1"/>
+          </p:cNvPicPr>
+          <p:nvPr/>
+        </p:nvPicPr>
+        <p:blipFill>
+          <a:blip r:embed="rId2"/>
+          <a:stretch>
+            <a:fillRect/>
+          </a:stretch>
+        </p:blipFill>
+        <p:spPr>
+          <a:xfrm>
+            <a:off x="838200" y="1672339"/>
+            <a:ext cx="10250714" cy="4963173"/>
+          </a:xfrm>
+          <a:prstGeom prst="rect">
+            <a:avLst/>
+          </a:prstGeom>
+        </p:spPr>
+      </p:pic>
+    </p:spTree>
+    <p:extLst>
+      <p:ext uri="{BB962C8B-B14F-4D97-AF65-F5344CB8AC3E}">
+        <p14:creationId xmlns:p14="http://schemas.microsoft.com/office/powerpoint/2010/main" val="2198841555"/>
       </p:ext>
     </p:extLst>
   </p:cSld>

</xml_diff>